<commit_message>
VECTO-28 - Preparations for release (minor update Release Notes)
</commit_message>
<xml_diff>
--- a/User Manual Source/Release Notes.pptx
+++ b/User Manual Source/Release Notes.pptx
@@ -13,12 +13,12 @@
   <p:sldIdLst>
     <p:sldId id="575" r:id="rId2"/>
     <p:sldId id="600" r:id="rId3"/>
-    <p:sldId id="628" r:id="rId4"/>
-    <p:sldId id="633" r:id="rId5"/>
-    <p:sldId id="629" r:id="rId6"/>
+    <p:sldId id="633" r:id="rId4"/>
+    <p:sldId id="629" r:id="rId5"/>
+    <p:sldId id="632" r:id="rId6"/>
     <p:sldId id="630" r:id="rId7"/>
     <p:sldId id="631" r:id="rId8"/>
-    <p:sldId id="632" r:id="rId9"/>
+    <p:sldId id="628" r:id="rId9"/>
     <p:sldId id="634" r:id="rId10"/>
     <p:sldId id="624" r:id="rId11"/>
     <p:sldId id="625" r:id="rId12"/>
@@ -385,18 +385,18 @@
       </p:sp>
       <p:sp>
         <p:nvSpPr>
-          <p:cNvPr id="52228" name="Rectangle 4"/>
+          <p:cNvPr id="52229" name="Rectangle 5"/>
           <p:cNvSpPr>
             <a:spLocks noGrp="1" noChangeArrowheads="1"/>
           </p:cNvSpPr>
           <p:nvPr>
-            <p:ph type="ftr" sz="quarter" idx="2"/>
+            <p:ph type="sldNum" sz="quarter" idx="3"/>
           </p:nvPr>
         </p:nvSpPr>
         <p:spPr bwMode="auto">
           <a:xfrm>
-            <a:off x="0" y="9445893"/>
-            <a:ext cx="2948846" cy="496665"/>
+            <a:off x="3855247" y="9445893"/>
+            <a:ext cx="2948845" cy="496665"/>
           </a:xfrm>
           <a:prstGeom prst="rect">
             <a:avLst/>
@@ -442,82 +442,6 @@
             </a:prstTxWarp>
           </a:bodyPr>
           <a:lstStyle>
-            <a:lvl1pPr algn="l">
-              <a:spcBef>
-                <a:spcPct val="0"/>
-              </a:spcBef>
-              <a:defRPr sz="1200" b="0">
-                <a:latin typeface="Arial" pitchFamily="34" charset="0"/>
-              </a:defRPr>
-            </a:lvl1pPr>
-          </a:lstStyle>
-          <a:p>
-            <a:pPr>
-              <a:defRPr/>
-            </a:pPr>
-            <a:endParaRPr lang="de-AT"/>
-          </a:p>
-        </p:txBody>
-      </p:sp>
-      <p:sp>
-        <p:nvSpPr>
-          <p:cNvPr id="52229" name="Rectangle 5"/>
-          <p:cNvSpPr>
-            <a:spLocks noGrp="1" noChangeArrowheads="1"/>
-          </p:cNvSpPr>
-          <p:nvPr>
-            <p:ph type="sldNum" sz="quarter" idx="3"/>
-          </p:nvPr>
-        </p:nvSpPr>
-        <p:spPr bwMode="auto">
-          <a:xfrm>
-            <a:off x="3855247" y="9445893"/>
-            <a:ext cx="2948845" cy="496665"/>
-          </a:xfrm>
-          <a:prstGeom prst="rect">
-            <a:avLst/>
-          </a:prstGeom>
-          <a:noFill/>
-          <a:ln>
-            <a:noFill/>
-          </a:ln>
-          <a:effectLst/>
-          <a:extLst>
-            <a:ext uri="{909E8E84-426E-40DD-AFC4-6F175D3DCCD1}">
-              <a14:hiddenFill xmlns:a14="http://schemas.microsoft.com/office/drawing/2010/main">
-                <a:solidFill>
-                  <a:schemeClr val="accent1"/>
-                </a:solidFill>
-              </a14:hiddenFill>
-            </a:ext>
-            <a:ext uri="{91240B29-F687-4F45-9708-019B960494DF}">
-              <a14:hiddenLine xmlns:a14="http://schemas.microsoft.com/office/drawing/2010/main" w="9525">
-                <a:solidFill>
-                  <a:schemeClr val="tx1"/>
-                </a:solidFill>
-                <a:miter lim="800000"/>
-                <a:headEnd/>
-                <a:tailEnd/>
-              </a14:hiddenLine>
-            </a:ext>
-            <a:ext uri="{AF507438-7753-43E0-B8FC-AC1667EBCBE1}">
-              <a14:hiddenEffects xmlns:a14="http://schemas.microsoft.com/office/drawing/2010/main">
-                <a:effectLst>
-                  <a:outerShdw dist="35921" dir="2700000" algn="ctr" rotWithShape="0">
-                    <a:schemeClr val="bg2"/>
-                  </a:outerShdw>
-                </a:effectLst>
-              </a14:hiddenEffects>
-            </a:ext>
-          </a:extLst>
-        </p:spPr>
-        <p:txBody>
-          <a:bodyPr vert="horz" wrap="square" lIns="88331" tIns="44166" rIns="88331" bIns="44166" numCol="1" anchor="b" anchorCtr="0" compatLnSpc="1">
-            <a:prstTxWarp prst="textNoShape">
-              <a:avLst/>
-            </a:prstTxWarp>
-          </a:bodyPr>
-          <a:lstStyle>
             <a:lvl1pPr algn="r">
               <a:spcBef>
                 <a:spcPct val="0"/>
@@ -539,6 +463,37 @@
               <a:t>‹#›</a:t>
             </a:fld>
             <a:endParaRPr lang="de-AT"/>
+          </a:p>
+        </p:txBody>
+      </p:sp>
+      <p:sp>
+        <p:nvSpPr>
+          <p:cNvPr id="2" name="Footer Placeholder 1"/>
+          <p:cNvSpPr>
+            <a:spLocks noGrp="1"/>
+          </p:cNvSpPr>
+          <p:nvPr>
+            <p:ph type="ftr" sz="quarter" idx="2"/>
+          </p:nvPr>
+        </p:nvSpPr>
+        <p:spPr>
+          <a:xfrm>
+            <a:off x="0" y="9445625"/>
+            <a:ext cx="2949575" cy="496888"/>
+          </a:xfrm>
+          <a:prstGeom prst="rect">
+            <a:avLst/>
+          </a:prstGeom>
+        </p:spPr>
+        <p:txBody>
+          <a:bodyPr vert="horz" lIns="91440" tIns="45720" rIns="91440" bIns="45720" rtlCol="0" anchor="b"/>
+          <a:lstStyle>
+            <a:lvl1pPr algn="l">
+              <a:defRPr sz="1200"/>
+            </a:lvl1pPr>
+          </a:lstStyle>
+          <a:p>
+            <a:endParaRPr lang="en-IE"/>
           </a:p>
         </p:txBody>
       </p:sp>
@@ -1435,7 +1390,7 @@
               <a:pPr>
                 <a:defRPr/>
               </a:pPr>
-              <a:t>5</a:t>
+              <a:t>8</a:t>
             </a:fld>
             <a:endParaRPr lang="de-AT"/>
           </a:p>
@@ -1899,7 +1854,7 @@
 </file>
 
 <file path=ppt/slideLayouts/slideLayout13.xml><?xml version="1.0" encoding="utf-8"?>
-<p:sldLayout xmlns:a="http://schemas.openxmlformats.org/drawingml/2006/main" xmlns:r="http://schemas.openxmlformats.org/officeDocument/2006/relationships" xmlns:p="http://schemas.openxmlformats.org/presentationml/2006/main" type="tbl" preserve="1">
+<p:sldLayout xmlns:a="http://schemas.openxmlformats.org/drawingml/2006/main" xmlns:r="http://schemas.openxmlformats.org/officeDocument/2006/relationships" xmlns:p="http://schemas.openxmlformats.org/presentationml/2006/main" preserve="1" userDrawn="1">
   <p:cSld name="Titel und Tabelle">
     <p:spTree>
       <p:nvGrpSpPr>
@@ -1917,34 +1872,6 @@
       </p:grpSpPr>
       <p:sp>
         <p:nvSpPr>
-          <p:cNvPr id="2" name="Titel 1"/>
-          <p:cNvSpPr>
-            <a:spLocks noGrp="1"/>
-          </p:cNvSpPr>
-          <p:nvPr>
-            <p:ph type="title"/>
-          </p:nvPr>
-        </p:nvSpPr>
-        <p:spPr>
-          <a:xfrm>
-            <a:off x="468315" y="714375"/>
-            <a:ext cx="8218487" cy="681038"/>
-          </a:xfrm>
-        </p:spPr>
-        <p:txBody>
-          <a:bodyPr/>
-          <a:lstStyle/>
-          <a:p>
-            <a:r>
-              <a:rPr lang="de-DE" smtClean="0"/>
-              <a:t>Titelmasterformat durch Klicken bearbeiten</a:t>
-            </a:r>
-            <a:endParaRPr lang="de-AT"/>
-          </a:p>
-        </p:txBody>
-      </p:sp>
-      <p:sp>
-        <p:nvSpPr>
           <p:cNvPr id="3" name="Tabellenplatzhalter 2"/>
           <p:cNvSpPr>
             <a:spLocks noGrp="1"/>
@@ -1965,6 +1892,29 @@
           <a:p>
             <a:pPr lvl="0"/>
             <a:endParaRPr lang="de-AT" noProof="0" smtClean="0"/>
+          </a:p>
+        </p:txBody>
+      </p:sp>
+      <p:sp>
+        <p:nvSpPr>
+          <p:cNvPr id="4" name="Title 3"/>
+          <p:cNvSpPr>
+            <a:spLocks noGrp="1"/>
+          </p:cNvSpPr>
+          <p:nvPr>
+            <p:ph type="title"/>
+          </p:nvPr>
+        </p:nvSpPr>
+        <p:spPr/>
+        <p:txBody>
+          <a:bodyPr/>
+          <a:lstStyle/>
+          <a:p>
+            <a:r>
+              <a:rPr lang="en-US" smtClean="0"/>
+              <a:t>Click to edit Master title style</a:t>
+            </a:r>
+            <a:endParaRPr lang="en-IE"/>
           </a:p>
         </p:txBody>
       </p:sp>
@@ -4176,7 +4126,7 @@
               <a:rPr lang="en-US" sz="1100" b="0" baseline="0" dirty="0" smtClean="0">
                 <a:latin typeface="Verdana" pitchFamily="34" charset="0"/>
               </a:rPr>
-              <a:t>Update Notes</a:t>
+              <a:t>Release Notes</a:t>
             </a:r>
             <a:endParaRPr lang="en-GB" sz="1100" b="0" dirty="0" smtClean="0">
               <a:latin typeface="Verdana" pitchFamily="34" charset="0"/>
@@ -4837,23 +4787,44 @@
                   <a:srgbClr val="990000"/>
                 </a:solidFill>
               </a:rPr>
-              <a:t>VECTO 2.0</a:t>
+              <a:t>VECTO </a:t>
+            </a:r>
+            <a:r>
+              <a:rPr lang="en-US" sz="3200" dirty="0" smtClean="0">
+                <a:solidFill>
+                  <a:srgbClr val="990000"/>
+                </a:solidFill>
+              </a:rPr>
+              <a:t>2.0.1</a:t>
+            </a:r>
+            <a:r>
+              <a:rPr lang="en-US" sz="3200" smtClean="0">
+                <a:solidFill>
+                  <a:srgbClr val="990000"/>
+                </a:solidFill>
+              </a:rPr>
+              <a:t/>
             </a:r>
             <a:br>
-              <a:rPr lang="en-US" sz="3200" dirty="0" smtClean="0">
+              <a:rPr lang="en-US" sz="3200" smtClean="0">
                 <a:solidFill>
                   <a:srgbClr val="990000"/>
                 </a:solidFill>
               </a:rPr>
             </a:br>
             <a:r>
-              <a:rPr lang="en-US" sz="2000" dirty="0" smtClean="0">
+              <a:rPr lang="en-US" sz="2000" smtClean="0">
                 <a:solidFill>
                   <a:srgbClr val="990000"/>
                 </a:solidFill>
               </a:rPr>
-              <a:t>15.04.2014</a:t>
-            </a:r>
+              <a:t>19.04.2014</a:t>
+            </a:r>
+            <a:endParaRPr lang="en-US" sz="2000" dirty="0" smtClean="0">
+              <a:solidFill>
+                <a:srgbClr val="990000"/>
+              </a:solidFill>
+            </a:endParaRPr>
           </a:p>
           <a:p>
             <a:pPr eaLnBrk="1" hangingPunct="1"/>
@@ -16522,7 +16493,11 @@
             <a:pPr eaLnBrk="1" hangingPunct="1"/>
             <a:r>
               <a:rPr lang="en-GB" sz="2800" kern="0" dirty="0" smtClean="0"/>
-              <a:t>VECTO 2.0</a:t>
+              <a:t>VECTO </a:t>
+            </a:r>
+            <a:r>
+              <a:rPr lang="en-GB" sz="2800" kern="0" dirty="0" smtClean="0"/>
+              <a:t>2.0.1</a:t>
             </a:r>
             <a:endParaRPr lang="en-GB" sz="2800" kern="0" dirty="0"/>
           </a:p>
@@ -16562,22 +16537,154 @@
               </a:spcBef>
             </a:pPr>
             <a:r>
+              <a:rPr lang="en-GB" sz="1800" dirty="0" smtClean="0"/>
+              <a:t>Important </a:t>
+            </a:r>
+            <a:r>
+              <a:rPr lang="en-GB" sz="1800" dirty="0" smtClean="0"/>
+              <a:t>additions and enhancements:</a:t>
+            </a:r>
+          </a:p>
+          <a:p>
+            <a:pPr marL="342900" indent="-342900" algn="l">
+              <a:lnSpc>
+                <a:spcPct val="150000"/>
+              </a:lnSpc>
+              <a:spcBef>
+                <a:spcPts val="600"/>
+              </a:spcBef>
+              <a:buFont typeface="Arial" pitchFamily="34" charset="0"/>
+              <a:buChar char="•"/>
+            </a:pPr>
+            <a:r>
+              <a:rPr lang="en-GB" dirty="0" smtClean="0"/>
+              <a:t>Declaration Mode</a:t>
+            </a:r>
+          </a:p>
+          <a:p>
+            <a:pPr marL="800100" lvl="1" indent="-342900" algn="l">
+              <a:spcBef>
+                <a:spcPts val="600"/>
+              </a:spcBef>
+              <a:buFont typeface="Arial" pitchFamily="34" charset="0"/>
+              <a:buChar char="•"/>
+            </a:pPr>
+            <a:r>
+              <a:rPr lang="en-GB" sz="1400" b="0" dirty="0" smtClean="0"/>
+              <a:t>Sets generic parameters for calculation </a:t>
+            </a:r>
+          </a:p>
+          <a:p>
+            <a:pPr marL="800100" lvl="1" indent="-342900" algn="l">
+              <a:spcBef>
+                <a:spcPts val="600"/>
+              </a:spcBef>
+              <a:buFont typeface="Arial" pitchFamily="34" charset="0"/>
+              <a:buChar char="•"/>
+            </a:pPr>
+            <a:r>
+              <a:rPr lang="en-GB" sz="1400" b="0" dirty="0" smtClean="0"/>
+              <a:t>L</a:t>
+            </a:r>
+            <a:r>
+              <a:rPr lang="en-GB" b="0" dirty="0" smtClean="0"/>
+              <a:t>ocks non-user input parameters in GUI</a:t>
+            </a:r>
+          </a:p>
+          <a:p>
+            <a:pPr marL="342900" indent="-342900" algn="l">
+              <a:lnSpc>
+                <a:spcPct val="150000"/>
+              </a:lnSpc>
+              <a:spcBef>
+                <a:spcPts val="600"/>
+              </a:spcBef>
+              <a:buFont typeface="Arial" pitchFamily="34" charset="0"/>
+              <a:buChar char="•"/>
+            </a:pPr>
+            <a:r>
+              <a:rPr lang="en-GB" dirty="0" smtClean="0"/>
+              <a:t>New input parameters and charts (with GUI updates)</a:t>
+            </a:r>
+            <a:endParaRPr lang="en-GB" dirty="0" smtClean="0"/>
+          </a:p>
+          <a:p>
+            <a:pPr marL="342900" indent="-342900" algn="l">
+              <a:lnSpc>
+                <a:spcPct val="150000"/>
+              </a:lnSpc>
+              <a:spcBef>
+                <a:spcPts val="600"/>
+              </a:spcBef>
+              <a:buFont typeface="Arial" pitchFamily="34" charset="0"/>
+              <a:buChar char="•"/>
+            </a:pPr>
+            <a:r>
+              <a:rPr lang="en-GB" dirty="0" smtClean="0"/>
+              <a:t>New internal visualizer for fast post processing</a:t>
+            </a:r>
+            <a:r>
+              <a:rPr lang="en-GB" sz="1200" b="0" dirty="0" smtClean="0"/>
+              <a:t> (replaces closed external tool </a:t>
+            </a:r>
+            <a:r>
+              <a:rPr lang="en-GB" sz="1200" b="0" dirty="0" err="1" smtClean="0"/>
+              <a:t>GRAPHi</a:t>
+            </a:r>
+            <a:r>
+              <a:rPr lang="en-GB" sz="1200" b="0" dirty="0" smtClean="0"/>
+              <a:t>)</a:t>
+            </a:r>
+          </a:p>
+          <a:p>
+            <a:pPr marL="342900" indent="-342900" algn="l">
+              <a:lnSpc>
+                <a:spcPct val="150000"/>
+              </a:lnSpc>
+              <a:spcBef>
+                <a:spcPts val="600"/>
+              </a:spcBef>
+              <a:buFont typeface="Arial" pitchFamily="34" charset="0"/>
+              <a:buChar char="•"/>
+            </a:pPr>
+            <a:r>
+              <a:rPr lang="en-GB" dirty="0" smtClean="0"/>
+              <a:t>WHTC Correction</a:t>
+            </a:r>
+          </a:p>
+          <a:p>
+            <a:pPr marL="342900" indent="-342900" algn="l">
+              <a:lnSpc>
+                <a:spcPct val="150000"/>
+              </a:lnSpc>
+              <a:spcBef>
+                <a:spcPts val="600"/>
+              </a:spcBef>
+              <a:buFont typeface="Arial" pitchFamily="34" charset="0"/>
+              <a:buChar char="•"/>
+            </a:pPr>
+            <a:r>
+              <a:rPr lang="en-GB" dirty="0" smtClean="0"/>
+              <a:t>Start/Stop auxiliary </a:t>
+            </a:r>
+            <a:r>
+              <a:rPr lang="en-GB" dirty="0" smtClean="0"/>
+              <a:t>correction</a:t>
+            </a:r>
+          </a:p>
+          <a:p>
+            <a:pPr algn="l">
+              <a:lnSpc>
+                <a:spcPct val="150000"/>
+              </a:lnSpc>
+              <a:spcBef>
+                <a:spcPts val="600"/>
+              </a:spcBef>
+            </a:pPr>
+            <a:r>
               <a:rPr lang="en-GB" sz="1800" dirty="0"/>
-              <a:t>Incompatible </a:t>
-            </a:r>
-            <a:r>
-              <a:rPr lang="en-GB" sz="1800" dirty="0" smtClean="0"/>
-              <a:t>changes </a:t>
-            </a:r>
-            <a:r>
-              <a:rPr lang="en-GB" sz="1800" dirty="0"/>
-              <a:t>since previous release (V1.4)</a:t>
-            </a:r>
-            <a:r>
-              <a:rPr lang="en-GB" sz="1800" dirty="0" smtClean="0"/>
-              <a:t>:</a:t>
-            </a:r>
-            <a:endParaRPr lang="en-GB" sz="1800" dirty="0"/>
+              <a:t>Incompatible changes since previous release (V1.4):</a:t>
+            </a:r>
           </a:p>
           <a:p>
             <a:pPr marL="800100" lvl="1" indent="-342900" algn="l">
@@ -16595,11 +16702,11 @@
               <a:t>File-format changes for </a:t>
             </a:r>
             <a:r>
-              <a:rPr lang="en-GB" dirty="0" err="1" smtClean="0"/>
+              <a:rPr lang="en-GB" dirty="0" err="1"/>
               <a:t>Input/Output</a:t>
             </a:r>
             <a:r>
-              <a:rPr lang="en-GB" dirty="0" smtClean="0"/>
+              <a:rPr lang="en-GB" dirty="0"/>
               <a:t> files</a:t>
             </a:r>
           </a:p>
@@ -16612,7 +16719,7 @@
               <a:buChar char="•"/>
             </a:pPr>
             <a:r>
-              <a:rPr lang="en-IE" sz="1400" b="0" dirty="0" smtClean="0"/>
+              <a:rPr lang="en-IE" sz="1400" b="0" dirty="0"/>
               <a:t>Old file-formats scrapped; CSV and JSON used everywhere</a:t>
             </a:r>
           </a:p>
@@ -16625,162 +16732,18 @@
               <a:buChar char="•"/>
             </a:pPr>
             <a:r>
+              <a:rPr lang="en-IE" sz="1400" b="0" dirty="0"/>
+              <a:t>CSVs: Use "#" for </a:t>
+            </a:r>
+            <a:r>
               <a:rPr lang="en-IE" sz="1400" b="0" dirty="0" smtClean="0"/>
-              <a:t>CSVs</a:t>
+              <a:t>comments, </a:t>
             </a:r>
             <a:r>
               <a:rPr lang="en-IE" sz="1400" b="0" dirty="0"/>
-              <a:t>: </a:t>
-            </a:r>
-            <a:r>
-              <a:rPr lang="en-IE" sz="1400" b="0" dirty="0" smtClean="0"/>
-              <a:t>Use "#" for comments , one </a:t>
-            </a:r>
-            <a:r>
-              <a:rPr lang="en-IE" sz="1400" b="0" dirty="0"/>
-              <a:t>and only one header-line </a:t>
-            </a:r>
-            <a:r>
-              <a:rPr lang="en-IE" sz="1400" b="0" dirty="0" smtClean="0"/>
-              <a:t>required</a:t>
-            </a:r>
-            <a:endParaRPr lang="en-IE" sz="1400" b="0" dirty="0"/>
-          </a:p>
-          <a:p>
-            <a:pPr algn="l">
-              <a:lnSpc>
-                <a:spcPct val="150000"/>
-              </a:lnSpc>
-              <a:spcBef>
-                <a:spcPts val="600"/>
-              </a:spcBef>
-            </a:pPr>
-            <a:r>
-              <a:rPr lang="en-GB" sz="1800" dirty="0" smtClean="0"/>
-              <a:t>Important additions and enhancements:</a:t>
-            </a:r>
-          </a:p>
-          <a:p>
-            <a:pPr marL="342900" indent="-342900" algn="l">
-              <a:lnSpc>
-                <a:spcPct val="150000"/>
-              </a:lnSpc>
-              <a:spcBef>
-                <a:spcPts val="600"/>
-              </a:spcBef>
-              <a:buFont typeface="Arial" pitchFamily="34" charset="0"/>
-              <a:buChar char="•"/>
-            </a:pPr>
-            <a:r>
-              <a:rPr lang="en-GB" dirty="0" smtClean="0"/>
-              <a:t>Declaration Mode</a:t>
-            </a:r>
-          </a:p>
-          <a:p>
-            <a:pPr marL="800100" lvl="1" indent="-342900" algn="l">
-              <a:spcBef>
-                <a:spcPts val="600"/>
-              </a:spcBef>
-              <a:buFont typeface="Arial" pitchFamily="34" charset="0"/>
-              <a:buChar char="•"/>
-            </a:pPr>
-            <a:r>
-              <a:rPr lang="en-GB" sz="1400" b="0" dirty="0" smtClean="0"/>
-              <a:t>Sets generic parameters for calculation </a:t>
-            </a:r>
-          </a:p>
-          <a:p>
-            <a:pPr marL="800100" lvl="1" indent="-342900" algn="l">
-              <a:spcBef>
-                <a:spcPts val="600"/>
-              </a:spcBef>
-              <a:buFont typeface="Arial" pitchFamily="34" charset="0"/>
-              <a:buChar char="•"/>
-            </a:pPr>
-            <a:r>
-              <a:rPr lang="en-GB" sz="1400" b="0" dirty="0" smtClean="0"/>
-              <a:t>L</a:t>
-            </a:r>
-            <a:r>
-              <a:rPr lang="en-GB" b="0" dirty="0" smtClean="0"/>
-              <a:t>ocks non-user input parameters in GUI</a:t>
-            </a:r>
-          </a:p>
-          <a:p>
-            <a:pPr marL="342900" indent="-342900" algn="l">
-              <a:lnSpc>
-                <a:spcPct val="150000"/>
-              </a:lnSpc>
-              <a:spcBef>
-                <a:spcPts val="600"/>
-              </a:spcBef>
-              <a:buFont typeface="Arial" pitchFamily="34" charset="0"/>
-              <a:buChar char="•"/>
-            </a:pPr>
-            <a:r>
-              <a:rPr lang="en-GB" dirty="0" smtClean="0"/>
-              <a:t>Updated GUI for new parameters and charts</a:t>
-            </a:r>
-          </a:p>
-          <a:p>
-            <a:pPr marL="342900" indent="-342900" algn="l">
-              <a:lnSpc>
-                <a:spcPct val="150000"/>
-              </a:lnSpc>
-              <a:spcBef>
-                <a:spcPts val="600"/>
-              </a:spcBef>
-              <a:buFont typeface="Arial" pitchFamily="34" charset="0"/>
-              <a:buChar char="•"/>
-            </a:pPr>
-            <a:r>
-              <a:rPr lang="en-GB" dirty="0" smtClean="0"/>
-              <a:t>New internal visualizer for fast post processing</a:t>
-            </a:r>
-            <a:r>
-              <a:rPr lang="en-GB" sz="1200" b="0" dirty="0" smtClean="0"/>
-              <a:t> (replaces closed external tool </a:t>
-            </a:r>
-            <a:r>
-              <a:rPr lang="en-GB" sz="1200" b="0" dirty="0" err="1" smtClean="0"/>
-              <a:t>GRAPHi</a:t>
-            </a:r>
-            <a:r>
-              <a:rPr lang="en-GB" sz="1200" b="0" dirty="0" smtClean="0"/>
-              <a:t>)</a:t>
-            </a:r>
-          </a:p>
-          <a:p>
-            <a:pPr marL="342900" indent="-342900" algn="l">
-              <a:lnSpc>
-                <a:spcPct val="150000"/>
-              </a:lnSpc>
-              <a:spcBef>
-                <a:spcPts val="600"/>
-              </a:spcBef>
-              <a:buFont typeface="Arial" pitchFamily="34" charset="0"/>
-              <a:buChar char="•"/>
-            </a:pPr>
-            <a:r>
-              <a:rPr lang="en-GB" dirty="0" smtClean="0"/>
-              <a:t>WHTC Correction</a:t>
-            </a:r>
-          </a:p>
-          <a:p>
-            <a:pPr marL="342900" indent="-342900" algn="l">
-              <a:lnSpc>
-                <a:spcPct val="150000"/>
-              </a:lnSpc>
-              <a:spcBef>
-                <a:spcPts val="600"/>
-              </a:spcBef>
-              <a:buFont typeface="Arial" pitchFamily="34" charset="0"/>
-              <a:buChar char="•"/>
-            </a:pPr>
-            <a:r>
-              <a:rPr lang="en-GB" dirty="0" smtClean="0"/>
-              <a:t>Start/Stop auxiliary correction</a:t>
-            </a:r>
+              <a:t>one and only one header-line required</a:t>
+            </a:r>
+            <a:endParaRPr lang="en-GB" dirty="0" smtClean="0"/>
           </a:p>
         </p:txBody>
       </p:sp>
@@ -22559,8 +22522,8 @@
         </p:nvSpPr>
         <p:spPr>
           <a:xfrm>
-            <a:off x="251522" y="1196752"/>
-            <a:ext cx="8496944" cy="3231654"/>
+            <a:off x="251522" y="1196756"/>
+            <a:ext cx="8496944" cy="3323987"/>
           </a:xfrm>
           <a:prstGeom prst="rect">
             <a:avLst/>
@@ -22587,22 +22550,9 @@
               <a:buChar char="•"/>
             </a:pPr>
             <a:r>
-              <a:rPr lang="en-IE" sz="1800" dirty="0"/>
-              <a:t>Old format </a:t>
-            </a:r>
-            <a:r>
-              <a:rPr lang="en-IE" sz="1800" dirty="0" smtClean="0"/>
-              <a:t>scrapped; </a:t>
-            </a:r>
-            <a:r>
-              <a:rPr lang="en-IE" sz="1800" dirty="0"/>
-              <a:t>only JSON and CSV is </a:t>
-            </a:r>
-            <a:r>
-              <a:rPr lang="en-IE" sz="1800" dirty="0" smtClean="0"/>
-              <a:t>supported</a:t>
-            </a:r>
-            <a:endParaRPr lang="en-IE" sz="1800" dirty="0"/>
+              <a:rPr lang="en-GB" b="0" dirty="0" smtClean="0"/>
+              <a:t>Declaration Mode is (de-)activated in the GUI as global parameter, i.e. is active for all following calculations</a:t>
+            </a:r>
           </a:p>
           <a:p>
             <a:pPr marL="342900" indent="-342900" algn="l">
@@ -22616,24 +22566,22 @@
               <a:buChar char="•"/>
             </a:pPr>
             <a:r>
-              <a:rPr lang="en-IE" sz="1800" dirty="0" smtClean="0"/>
-              <a:t>CSVs: New </a:t>
-            </a:r>
-            <a:r>
-              <a:rPr lang="en-IE" sz="1800" dirty="0"/>
-              <a:t>comment symbol </a:t>
-            </a:r>
-            <a:r>
-              <a:rPr lang="en-IE" sz="1800" dirty="0" smtClean="0"/>
-              <a:t>is "#" (instead </a:t>
-            </a:r>
-            <a:r>
-              <a:rPr lang="en-IE" sz="1800" dirty="0"/>
-              <a:t>of "</a:t>
-            </a:r>
-            <a:r>
-              <a:rPr lang="en-IE" sz="1800" dirty="0" smtClean="0"/>
-              <a:t>c“)</a:t>
+              <a:rPr lang="en-GB" b="0" dirty="0" smtClean="0"/>
+              <a:t>When active all non- user-input parameters are locked</a:t>
+            </a:r>
+          </a:p>
+          <a:p>
+            <a:pPr lvl="1" algn="l">
+              <a:lnSpc>
+                <a:spcPct val="150000"/>
+              </a:lnSpc>
+              <a:spcBef>
+                <a:spcPts val="600"/>
+              </a:spcBef>
+            </a:pPr>
+            <a:r>
+              <a:rPr lang="en-GB" dirty="0" smtClean="0"/>
+              <a:t>Example: Axle configuration in vehicle file:</a:t>
             </a:r>
           </a:p>
           <a:p>
@@ -22647,10 +22595,7 @@
               <a:buFont typeface="Arial" pitchFamily="34" charset="0"/>
               <a:buChar char="•"/>
             </a:pPr>
-            <a:r>
-              <a:rPr lang="en-IE" sz="1800" dirty="0" smtClean="0"/>
-              <a:t>CSVs: One and only one header-line is required (which must not be a comment line)</a:t>
-            </a:r>
+            <a:endParaRPr lang="en-GB" sz="1400" b="0" dirty="0"/>
           </a:p>
           <a:p>
             <a:pPr marL="342900" indent="-342900" algn="l">
@@ -22663,31 +22608,33 @@
               <a:buFont typeface="Arial" pitchFamily="34" charset="0"/>
               <a:buChar char="•"/>
             </a:pPr>
-            <a:r>
-              <a:rPr lang="en-IE" sz="1800" dirty="0" smtClean="0"/>
-              <a:t>The formats are described in </a:t>
-            </a:r>
-            <a:r>
-              <a:rPr lang="en-IE" sz="1800" dirty="0"/>
-              <a:t>the HTML User Manual under </a:t>
-            </a:r>
-            <a:r>
-              <a:rPr lang="en-IE" sz="1800" dirty="0" smtClean="0"/>
-              <a:t>“Input </a:t>
-            </a:r>
-            <a:r>
-              <a:rPr lang="en-IE" sz="1800" dirty="0"/>
-              <a:t>and Output </a:t>
-            </a:r>
-            <a:r>
-              <a:rPr lang="en-IE" sz="1800" dirty="0" smtClean="0"/>
-              <a:t>Files” &gt; “CSV Format” </a:t>
-            </a:r>
-            <a:r>
-              <a:rPr lang="en-IE" sz="1800" dirty="0"/>
-              <a:t>and in each input file page of the user manual.</a:t>
-            </a:r>
-            <a:endParaRPr lang="en-GB" sz="1800" b="0" dirty="0" smtClean="0"/>
+            <a:endParaRPr lang="en-GB" sz="1400" b="0" dirty="0" smtClean="0"/>
+          </a:p>
+          <a:p>
+            <a:pPr marL="342900" indent="-342900" algn="l">
+              <a:lnSpc>
+                <a:spcPct val="150000"/>
+              </a:lnSpc>
+              <a:spcBef>
+                <a:spcPts val="600"/>
+              </a:spcBef>
+              <a:buFont typeface="Arial" pitchFamily="34" charset="0"/>
+              <a:buChar char="•"/>
+            </a:pPr>
+            <a:endParaRPr lang="en-GB" sz="1400" b="0" dirty="0"/>
+          </a:p>
+          <a:p>
+            <a:pPr marL="342900" indent="-342900" algn="l">
+              <a:lnSpc>
+                <a:spcPct val="150000"/>
+              </a:lnSpc>
+              <a:spcBef>
+                <a:spcPts val="600"/>
+              </a:spcBef>
+              <a:buFont typeface="Arial" pitchFamily="34" charset="0"/>
+              <a:buChar char="•"/>
+            </a:pPr>
+            <a:endParaRPr lang="en-GB" sz="1400" b="0" dirty="0" smtClean="0"/>
           </a:p>
         </p:txBody>
       </p:sp>
@@ -22881,16 +22828,477 @@
             <a:pPr eaLnBrk="1" hangingPunct="1"/>
             <a:r>
               <a:rPr lang="en-GB" sz="2800" kern="0" dirty="0" smtClean="0"/>
-              <a:t>File-format changes</a:t>
+              <a:t>Declaration Mode</a:t>
             </a:r>
             <a:endParaRPr lang="en-GB" sz="2800" kern="0" dirty="0"/>
           </a:p>
         </p:txBody>
       </p:sp>
+      <p:pic>
+        <p:nvPicPr>
+          <p:cNvPr id="7" name="Picture 5"/>
+          <p:cNvPicPr>
+            <a:picLocks noChangeAspect="1" noChangeArrowheads="1"/>
+          </p:cNvPicPr>
+          <p:nvPr/>
+        </p:nvPicPr>
+        <p:blipFill>
+          <a:blip r:embed="rId3">
+            <a:extLst>
+              <a:ext uri="{28A0092B-C50C-407E-A947-70E740481C1C}">
+                <a14:useLocalDpi xmlns:a14="http://schemas.microsoft.com/office/drawing/2010/main" val="0"/>
+              </a:ext>
+            </a:extLst>
+          </a:blip>
+          <a:srcRect/>
+          <a:stretch>
+            <a:fillRect/>
+          </a:stretch>
+        </p:blipFill>
+        <p:spPr bwMode="auto">
+          <a:xfrm>
+            <a:off x="2697689" y="1691880"/>
+            <a:ext cx="1123950" cy="238125"/>
+          </a:xfrm>
+          <a:prstGeom prst="rect">
+            <a:avLst/>
+          </a:prstGeom>
+          <a:noFill/>
+          <a:ln>
+            <a:noFill/>
+          </a:ln>
+          <a:extLst>
+            <a:ext uri="{909E8E84-426E-40DD-AFC4-6F175D3DCCD1}">
+              <a14:hiddenFill xmlns:a14="http://schemas.microsoft.com/office/drawing/2010/main">
+                <a:solidFill>
+                  <a:schemeClr val="accent1"/>
+                </a:solidFill>
+              </a14:hiddenFill>
+            </a:ext>
+            <a:ext uri="{91240B29-F687-4F45-9708-019B960494DF}">
+              <a14:hiddenLine xmlns:a14="http://schemas.microsoft.com/office/drawing/2010/main" w="9525">
+                <a:solidFill>
+                  <a:schemeClr val="tx1"/>
+                </a:solidFill>
+                <a:miter lim="800000"/>
+                <a:headEnd/>
+                <a:tailEnd/>
+              </a14:hiddenLine>
+            </a:ext>
+          </a:extLst>
+        </p:spPr>
+      </p:pic>
+      <p:pic>
+        <p:nvPicPr>
+          <p:cNvPr id="17" name="Picture 19"/>
+          <p:cNvPicPr>
+            <a:picLocks noChangeAspect="1" noChangeArrowheads="1"/>
+          </p:cNvPicPr>
+          <p:nvPr/>
+        </p:nvPicPr>
+        <p:blipFill>
+          <a:blip r:embed="rId4">
+            <a:extLst>
+              <a:ext uri="{28A0092B-C50C-407E-A947-70E740481C1C}">
+                <a14:useLocalDpi xmlns:a14="http://schemas.microsoft.com/office/drawing/2010/main" val="0"/>
+              </a:ext>
+            </a:extLst>
+          </a:blip>
+          <a:srcRect/>
+          <a:stretch>
+            <a:fillRect/>
+          </a:stretch>
+        </p:blipFill>
+        <p:spPr bwMode="auto">
+          <a:xfrm>
+            <a:off x="1111412" y="3129880"/>
+            <a:ext cx="3316574" cy="2315344"/>
+          </a:xfrm>
+          <a:prstGeom prst="rect">
+            <a:avLst/>
+          </a:prstGeom>
+          <a:noFill/>
+          <a:ln>
+            <a:noFill/>
+          </a:ln>
+          <a:extLst>
+            <a:ext uri="{909E8E84-426E-40DD-AFC4-6F175D3DCCD1}">
+              <a14:hiddenFill xmlns:a14="http://schemas.microsoft.com/office/drawing/2010/main">
+                <a:solidFill>
+                  <a:schemeClr val="accent1"/>
+                </a:solidFill>
+              </a14:hiddenFill>
+            </a:ext>
+            <a:ext uri="{91240B29-F687-4F45-9708-019B960494DF}">
+              <a14:hiddenLine xmlns:a14="http://schemas.microsoft.com/office/drawing/2010/main" w="9525">
+                <a:solidFill>
+                  <a:schemeClr val="tx1"/>
+                </a:solidFill>
+                <a:miter lim="800000"/>
+                <a:headEnd/>
+                <a:tailEnd/>
+              </a14:hiddenLine>
+            </a:ext>
+          </a:extLst>
+        </p:spPr>
+      </p:pic>
+      <p:pic>
+        <p:nvPicPr>
+          <p:cNvPr id="21" name="Picture 20"/>
+          <p:cNvPicPr>
+            <a:picLocks noChangeAspect="1" noChangeArrowheads="1"/>
+          </p:cNvPicPr>
+          <p:nvPr/>
+        </p:nvPicPr>
+        <p:blipFill>
+          <a:blip r:embed="rId5">
+            <a:extLst>
+              <a:ext uri="{28A0092B-C50C-407E-A947-70E740481C1C}">
+                <a14:useLocalDpi xmlns:a14="http://schemas.microsoft.com/office/drawing/2010/main" val="0"/>
+              </a:ext>
+            </a:extLst>
+          </a:blip>
+          <a:srcRect/>
+          <a:stretch>
+            <a:fillRect/>
+          </a:stretch>
+        </p:blipFill>
+        <p:spPr bwMode="auto">
+          <a:xfrm>
+            <a:off x="5143859" y="3129880"/>
+            <a:ext cx="3316574" cy="2315344"/>
+          </a:xfrm>
+          <a:prstGeom prst="rect">
+            <a:avLst/>
+          </a:prstGeom>
+          <a:noFill/>
+          <a:ln>
+            <a:noFill/>
+          </a:ln>
+          <a:extLst>
+            <a:ext uri="{909E8E84-426E-40DD-AFC4-6F175D3DCCD1}">
+              <a14:hiddenFill xmlns:a14="http://schemas.microsoft.com/office/drawing/2010/main">
+                <a:solidFill>
+                  <a:schemeClr val="accent1"/>
+                </a:solidFill>
+              </a14:hiddenFill>
+            </a:ext>
+            <a:ext uri="{91240B29-F687-4F45-9708-019B960494DF}">
+              <a14:hiddenLine xmlns:a14="http://schemas.microsoft.com/office/drawing/2010/main" w="9525">
+                <a:solidFill>
+                  <a:schemeClr val="tx1"/>
+                </a:solidFill>
+                <a:miter lim="800000"/>
+                <a:headEnd/>
+                <a:tailEnd/>
+              </a14:hiddenLine>
+            </a:ext>
+          </a:extLst>
+        </p:spPr>
+      </p:pic>
+      <p:sp>
+        <p:nvSpPr>
+          <p:cNvPr id="23" name="Textfeld 22"/>
+          <p:cNvSpPr txBox="1"/>
+          <p:nvPr/>
+        </p:nvSpPr>
+        <p:spPr>
+          <a:xfrm>
+            <a:off x="1229800" y="2840411"/>
+            <a:ext cx="3126177" cy="276999"/>
+          </a:xfrm>
+          <a:prstGeom prst="rect">
+            <a:avLst/>
+          </a:prstGeom>
+          <a:noFill/>
+        </p:spPr>
+        <p:txBody>
+          <a:bodyPr wrap="none" rtlCol="0">
+            <a:spAutoFit/>
+          </a:bodyPr>
+          <a:lstStyle/>
+          <a:p>
+            <a:r>
+              <a:rPr lang="en-GB" sz="1200" b="0" dirty="0" smtClean="0"/>
+              <a:t>Declaration Mode OFF (Engineering Mode)</a:t>
+            </a:r>
+            <a:endParaRPr lang="en-GB" sz="1200" b="0" dirty="0"/>
+          </a:p>
+        </p:txBody>
+      </p:sp>
+      <p:sp>
+        <p:nvSpPr>
+          <p:cNvPr id="45" name="Textfeld 44"/>
+          <p:cNvSpPr txBox="1"/>
+          <p:nvPr/>
+        </p:nvSpPr>
+        <p:spPr>
+          <a:xfrm>
+            <a:off x="5972432" y="2840412"/>
+            <a:ext cx="1659430" cy="276999"/>
+          </a:xfrm>
+          <a:prstGeom prst="rect">
+            <a:avLst/>
+          </a:prstGeom>
+          <a:noFill/>
+        </p:spPr>
+        <p:txBody>
+          <a:bodyPr wrap="none" rtlCol="0">
+            <a:spAutoFit/>
+          </a:bodyPr>
+          <a:lstStyle/>
+          <a:p>
+            <a:r>
+              <a:rPr lang="en-GB" sz="1200" b="0" dirty="0" smtClean="0"/>
+              <a:t>Declaration Mode ON</a:t>
+            </a:r>
+            <a:endParaRPr lang="en-GB" sz="1200" b="0" dirty="0"/>
+          </a:p>
+        </p:txBody>
+      </p:sp>
+      <p:sp>
+        <p:nvSpPr>
+          <p:cNvPr id="46" name="Textfeld 45"/>
+          <p:cNvSpPr txBox="1"/>
+          <p:nvPr/>
+        </p:nvSpPr>
+        <p:spPr>
+          <a:xfrm>
+            <a:off x="1111410" y="5482163"/>
+            <a:ext cx="3172558" cy="523220"/>
+          </a:xfrm>
+          <a:prstGeom prst="rect">
+            <a:avLst/>
+          </a:prstGeom>
+          <a:noFill/>
+        </p:spPr>
+        <p:txBody>
+          <a:bodyPr wrap="square" rtlCol="0">
+            <a:spAutoFit/>
+          </a:bodyPr>
+          <a:lstStyle/>
+          <a:p>
+            <a:pPr algn="l"/>
+            <a:r>
+              <a:rPr lang="en-GB" sz="1400" b="0" dirty="0" smtClean="0"/>
+              <a:t>Relative axle load and wheels inertia are user-defined</a:t>
+            </a:r>
+            <a:endParaRPr lang="en-GB" sz="1400" b="0" dirty="0"/>
+          </a:p>
+        </p:txBody>
+      </p:sp>
+      <p:sp>
+        <p:nvSpPr>
+          <p:cNvPr id="47" name="Textfeld 46"/>
+          <p:cNvSpPr txBox="1"/>
+          <p:nvPr/>
+        </p:nvSpPr>
+        <p:spPr>
+          <a:xfrm>
+            <a:off x="5215866" y="5478432"/>
+            <a:ext cx="3820630" cy="846386"/>
+          </a:xfrm>
+          <a:prstGeom prst="rect">
+            <a:avLst/>
+          </a:prstGeom>
+          <a:noFill/>
+        </p:spPr>
+        <p:txBody>
+          <a:bodyPr wrap="square" rtlCol="0">
+            <a:spAutoFit/>
+          </a:bodyPr>
+          <a:lstStyle/>
+          <a:p>
+            <a:pPr algn="l"/>
+            <a:r>
+              <a:rPr lang="en-GB" sz="1400" b="0" dirty="0" smtClean="0"/>
+              <a:t>Relative axle load is set according to HDV class and mission profile.</a:t>
+            </a:r>
+          </a:p>
+          <a:p>
+            <a:pPr algn="l"/>
+            <a:r>
+              <a:rPr lang="en-GB" sz="1400" b="0" dirty="0" smtClean="0"/>
+              <a:t>Wheels inertia depends on selected wheels</a:t>
+            </a:r>
+            <a:endParaRPr lang="en-GB" sz="1400" b="0" dirty="0"/>
+          </a:p>
+        </p:txBody>
+      </p:sp>
+      <p:sp>
+        <p:nvSpPr>
+          <p:cNvPr id="24" name="Rechteck 23"/>
+          <p:cNvSpPr/>
+          <p:nvPr/>
+        </p:nvSpPr>
+        <p:spPr bwMode="auto">
+          <a:xfrm>
+            <a:off x="1229803" y="3752850"/>
+            <a:ext cx="1496632" cy="252214"/>
+          </a:xfrm>
+          <a:prstGeom prst="rect">
+            <a:avLst/>
+          </a:prstGeom>
+          <a:noFill/>
+          <a:ln w="28575" cap="flat" cmpd="sng" algn="ctr">
+            <a:solidFill>
+              <a:srgbClr val="C00000"/>
+            </a:solidFill>
+            <a:prstDash val="solid"/>
+            <a:round/>
+            <a:headEnd type="none" w="med" len="med"/>
+            <a:tailEnd type="triangle" w="med" len="med"/>
+          </a:ln>
+          <a:effectLst/>
+          <a:extLst/>
+        </p:spPr>
+        <p:txBody>
+          <a:bodyPr vert="horz" wrap="square" lIns="91440" tIns="45720" rIns="91440" bIns="45720" numCol="1" rtlCol="0" anchor="ctr" anchorCtr="0" compatLnSpc="1">
+            <a:prstTxWarp prst="textNoShape">
+              <a:avLst/>
+            </a:prstTxWarp>
+            <a:noAutofit/>
+          </a:bodyPr>
+          <a:lstStyle/>
+          <a:p>
+            <a:pPr marL="0" marR="0" indent="0" algn="ctr" defTabSz="914400" rtl="0" eaLnBrk="1" fontAlgn="base" latinLnBrk="0" hangingPunct="1">
+              <a:lnSpc>
+                <a:spcPct val="100000"/>
+              </a:lnSpc>
+              <a:spcBef>
+                <a:spcPct val="30000"/>
+              </a:spcBef>
+              <a:spcAft>
+                <a:spcPct val="0"/>
+              </a:spcAft>
+              <a:buClrTx/>
+              <a:buSzTx/>
+              <a:buFontTx/>
+              <a:buNone/>
+              <a:tabLst/>
+            </a:pPr>
+            <a:endParaRPr kumimoji="0" lang="en-GB" sz="2000" b="1" i="0" u="none" strike="noStrike" cap="none" normalizeH="0" baseline="0" smtClean="0">
+              <a:ln>
+                <a:noFill/>
+              </a:ln>
+              <a:solidFill>
+                <a:schemeClr val="tx1"/>
+              </a:solidFill>
+              <a:effectLst/>
+              <a:latin typeface="Arial" pitchFamily="34" charset="0"/>
+            </a:endParaRPr>
+          </a:p>
+        </p:txBody>
+      </p:sp>
+      <p:sp>
+        <p:nvSpPr>
+          <p:cNvPr id="49" name="Rechteck 48"/>
+          <p:cNvSpPr/>
+          <p:nvPr/>
+        </p:nvSpPr>
+        <p:spPr bwMode="auto">
+          <a:xfrm>
+            <a:off x="2826447" y="3752850"/>
+            <a:ext cx="1457523" cy="252214"/>
+          </a:xfrm>
+          <a:prstGeom prst="rect">
+            <a:avLst/>
+          </a:prstGeom>
+          <a:noFill/>
+          <a:ln w="28575" cap="flat" cmpd="sng" algn="ctr">
+            <a:solidFill>
+              <a:srgbClr val="C00000"/>
+            </a:solidFill>
+            <a:prstDash val="solid"/>
+            <a:round/>
+            <a:headEnd type="none" w="med" len="med"/>
+            <a:tailEnd type="triangle" w="med" len="med"/>
+          </a:ln>
+          <a:effectLst/>
+          <a:extLst/>
+        </p:spPr>
+        <p:txBody>
+          <a:bodyPr vert="horz" wrap="square" lIns="91440" tIns="45720" rIns="91440" bIns="45720" numCol="1" rtlCol="0" anchor="ctr" anchorCtr="0" compatLnSpc="1">
+            <a:prstTxWarp prst="textNoShape">
+              <a:avLst/>
+            </a:prstTxWarp>
+            <a:noAutofit/>
+          </a:bodyPr>
+          <a:lstStyle/>
+          <a:p>
+            <a:pPr marL="0" marR="0" indent="0" algn="ctr" defTabSz="914400" rtl="0" eaLnBrk="1" fontAlgn="base" latinLnBrk="0" hangingPunct="1">
+              <a:lnSpc>
+                <a:spcPct val="100000"/>
+              </a:lnSpc>
+              <a:spcBef>
+                <a:spcPct val="30000"/>
+              </a:spcBef>
+              <a:spcAft>
+                <a:spcPct val="0"/>
+              </a:spcAft>
+              <a:buClrTx/>
+              <a:buSzTx/>
+              <a:buFontTx/>
+              <a:buNone/>
+              <a:tabLst/>
+            </a:pPr>
+            <a:endParaRPr kumimoji="0" lang="en-GB" sz="2000" b="1" i="0" u="none" strike="noStrike" cap="none" normalizeH="0" baseline="0" smtClean="0">
+              <a:ln>
+                <a:noFill/>
+              </a:ln>
+              <a:solidFill>
+                <a:schemeClr val="tx1"/>
+              </a:solidFill>
+              <a:effectLst/>
+              <a:latin typeface="Arial" pitchFamily="34" charset="0"/>
+            </a:endParaRPr>
+          </a:p>
+        </p:txBody>
+      </p:sp>
+      <p:cxnSp>
+        <p:nvCxnSpPr>
+          <p:cNvPr id="27" name="Gerade Verbindung mit Pfeil 26"/>
+          <p:cNvCxnSpPr/>
+          <p:nvPr/>
+        </p:nvCxnSpPr>
+        <p:spPr bwMode="auto">
+          <a:xfrm>
+            <a:off x="6457672" y="3614291"/>
+            <a:ext cx="945777" cy="204677"/>
+          </a:xfrm>
+          <a:prstGeom prst="straightConnector1">
+            <a:avLst/>
+          </a:prstGeom>
+          <a:solidFill>
+            <a:schemeClr val="accent1"/>
+          </a:solidFill>
+          <a:ln w="28575" cap="flat" cmpd="sng" algn="ctr">
+            <a:solidFill>
+              <a:srgbClr val="C00000"/>
+            </a:solidFill>
+            <a:prstDash val="solid"/>
+            <a:round/>
+            <a:headEnd type="none" w="med" len="med"/>
+            <a:tailEnd type="arrow"/>
+          </a:ln>
+          <a:effectLst/>
+          <a:extLst>
+            <a:ext uri="{AF507438-7753-43E0-B8FC-AC1667EBCBE1}">
+              <a14:hiddenEffects xmlns:a14="http://schemas.microsoft.com/office/drawing/2010/main">
+                <a:effectLst>
+                  <a:outerShdw dist="35921" dir="2700000" algn="ctr" rotWithShape="0">
+                    <a:schemeClr val="bg2"/>
+                  </a:outerShdw>
+                </a:effectLst>
+              </a14:hiddenEffects>
+            </a:ext>
+          </a:extLst>
+        </p:spPr>
+      </p:cxnSp>
     </p:spTree>
     <p:extLst>
       <p:ext uri="{BB962C8B-B14F-4D97-AF65-F5344CB8AC3E}">
-        <p14:creationId xmlns:p14="http://schemas.microsoft.com/office/powerpoint/2010/main" val="1434757261"/>
+        <p14:creationId xmlns:p14="http://schemas.microsoft.com/office/powerpoint/2010/main" val="1419265606"/>
       </p:ext>
     </p:extLst>
   </p:cSld>
@@ -29375,7 +29783,7 @@
         <p:spPr>
           <a:xfrm>
             <a:off x="251522" y="1196756"/>
-            <a:ext cx="8496944" cy="3323987"/>
+            <a:ext cx="8496944" cy="4739759"/>
           </a:xfrm>
           <a:prstGeom prst="rect">
             <a:avLst/>
@@ -29403,23 +29811,7 @@
             </a:pPr>
             <a:r>
               <a:rPr lang="en-GB" b="0" dirty="0" smtClean="0"/>
-              <a:t>Declaration Mode is (de-)activated in the GUI as global parameter, i.e. is active for all following calculations</a:t>
-            </a:r>
-          </a:p>
-          <a:p>
-            <a:pPr marL="342900" indent="-342900" algn="l">
-              <a:lnSpc>
-                <a:spcPct val="150000"/>
-              </a:lnSpc>
-              <a:spcBef>
-                <a:spcPts val="600"/>
-              </a:spcBef>
-              <a:buFont typeface="Arial" pitchFamily="34" charset="0"/>
-              <a:buChar char="•"/>
-            </a:pPr>
-            <a:r>
-              <a:rPr lang="en-GB" b="0" dirty="0" smtClean="0"/>
-              <a:t>When active all non- user-input parameters are locked</a:t>
+              <a:t>Automatic assignment of generic values</a:t>
             </a:r>
           </a:p>
           <a:p>
@@ -29433,7 +29825,100 @@
             </a:pPr>
             <a:r>
               <a:rPr lang="en-GB" dirty="0" smtClean="0"/>
-              <a:t>Example: Axle configuration in vehicle file:</a:t>
+              <a:t>Examples:</a:t>
+            </a:r>
+          </a:p>
+          <a:p>
+            <a:pPr marL="800100" lvl="1" indent="-342900" algn="l">
+              <a:lnSpc>
+                <a:spcPct val="150000"/>
+              </a:lnSpc>
+              <a:spcBef>
+                <a:spcPts val="600"/>
+              </a:spcBef>
+              <a:buFont typeface="Arial" pitchFamily="34" charset="0"/>
+              <a:buChar char="•"/>
+            </a:pPr>
+            <a:r>
+              <a:rPr lang="en-GB" b="0" dirty="0" smtClean="0"/>
+              <a:t>Mission profiles 	...</a:t>
+            </a:r>
+            <a:r>
+              <a:rPr lang="en-GB" b="0" dirty="0"/>
+              <a:t>based on HDV class</a:t>
+            </a:r>
+            <a:endParaRPr lang="en-GB" b="0" dirty="0" smtClean="0"/>
+          </a:p>
+          <a:p>
+            <a:pPr marL="800100" lvl="1" indent="-342900" algn="l">
+              <a:lnSpc>
+                <a:spcPct val="150000"/>
+              </a:lnSpc>
+              <a:spcBef>
+                <a:spcPts val="600"/>
+              </a:spcBef>
+              <a:buFont typeface="Arial" pitchFamily="34" charset="0"/>
+              <a:buChar char="•"/>
+            </a:pPr>
+            <a:r>
+              <a:rPr lang="en-GB" b="0" dirty="0" smtClean="0"/>
+              <a:t>Loading		...based on HDV class and mission profile</a:t>
+            </a:r>
+          </a:p>
+          <a:p>
+            <a:pPr marL="800100" lvl="1" indent="-342900" algn="l">
+              <a:lnSpc>
+                <a:spcPct val="150000"/>
+              </a:lnSpc>
+              <a:spcBef>
+                <a:spcPts val="600"/>
+              </a:spcBef>
+              <a:buFont typeface="Arial" pitchFamily="34" charset="0"/>
+              <a:buChar char="•"/>
+            </a:pPr>
+            <a:r>
+              <a:rPr lang="en-GB" b="0" dirty="0" smtClean="0"/>
+              <a:t>Trailer RRC &amp; weight	...based </a:t>
+            </a:r>
+            <a:r>
+              <a:rPr lang="en-GB" b="0" dirty="0"/>
+              <a:t>on HDV class and mission </a:t>
+            </a:r>
+            <a:r>
+              <a:rPr lang="en-GB" b="0" dirty="0" smtClean="0"/>
+              <a:t>profile</a:t>
+            </a:r>
+          </a:p>
+          <a:p>
+            <a:pPr marL="800100" lvl="1" indent="-342900" algn="l">
+              <a:lnSpc>
+                <a:spcPct val="150000"/>
+              </a:lnSpc>
+              <a:spcBef>
+                <a:spcPts val="600"/>
+              </a:spcBef>
+              <a:buFont typeface="Arial" pitchFamily="34" charset="0"/>
+              <a:buChar char="•"/>
+            </a:pPr>
+            <a:r>
+              <a:rPr lang="en-GB" b="0" dirty="0" smtClean="0"/>
+              <a:t>Shift polygons	...based on full load curves</a:t>
+            </a:r>
+          </a:p>
+          <a:p>
+            <a:pPr marL="800100" lvl="1" indent="-342900" algn="l">
+              <a:lnSpc>
+                <a:spcPct val="150000"/>
+              </a:lnSpc>
+              <a:spcBef>
+                <a:spcPts val="600"/>
+              </a:spcBef>
+              <a:buFont typeface="Arial" pitchFamily="34" charset="0"/>
+              <a:buChar char="•"/>
+            </a:pPr>
+            <a:r>
+              <a:rPr lang="en-GB" b="0" dirty="0" smtClean="0"/>
+              <a:t>Engine inertia	...based on engine displacement</a:t>
             </a:r>
           </a:p>
           <a:p>
@@ -29686,471 +30171,10 @@
           </a:p>
         </p:txBody>
       </p:sp>
-      <p:pic>
-        <p:nvPicPr>
-          <p:cNvPr id="7" name="Picture 5"/>
-          <p:cNvPicPr>
-            <a:picLocks noChangeAspect="1" noChangeArrowheads="1"/>
-          </p:cNvPicPr>
-          <p:nvPr/>
-        </p:nvPicPr>
-        <p:blipFill>
-          <a:blip r:embed="rId3">
-            <a:extLst>
-              <a:ext uri="{28A0092B-C50C-407E-A947-70E740481C1C}">
-                <a14:useLocalDpi xmlns:a14="http://schemas.microsoft.com/office/drawing/2010/main" val="0"/>
-              </a:ext>
-            </a:extLst>
-          </a:blip>
-          <a:srcRect/>
-          <a:stretch>
-            <a:fillRect/>
-          </a:stretch>
-        </p:blipFill>
-        <p:spPr bwMode="auto">
-          <a:xfrm>
-            <a:off x="2697689" y="1691880"/>
-            <a:ext cx="1123950" cy="238125"/>
-          </a:xfrm>
-          <a:prstGeom prst="rect">
-            <a:avLst/>
-          </a:prstGeom>
-          <a:noFill/>
-          <a:ln>
-            <a:noFill/>
-          </a:ln>
-          <a:extLst>
-            <a:ext uri="{909E8E84-426E-40DD-AFC4-6F175D3DCCD1}">
-              <a14:hiddenFill xmlns:a14="http://schemas.microsoft.com/office/drawing/2010/main">
-                <a:solidFill>
-                  <a:schemeClr val="accent1"/>
-                </a:solidFill>
-              </a14:hiddenFill>
-            </a:ext>
-            <a:ext uri="{91240B29-F687-4F45-9708-019B960494DF}">
-              <a14:hiddenLine xmlns:a14="http://schemas.microsoft.com/office/drawing/2010/main" w="9525">
-                <a:solidFill>
-                  <a:schemeClr val="tx1"/>
-                </a:solidFill>
-                <a:miter lim="800000"/>
-                <a:headEnd/>
-                <a:tailEnd/>
-              </a14:hiddenLine>
-            </a:ext>
-          </a:extLst>
-        </p:spPr>
-      </p:pic>
-      <p:pic>
-        <p:nvPicPr>
-          <p:cNvPr id="17" name="Picture 19"/>
-          <p:cNvPicPr>
-            <a:picLocks noChangeAspect="1" noChangeArrowheads="1"/>
-          </p:cNvPicPr>
-          <p:nvPr/>
-        </p:nvPicPr>
-        <p:blipFill>
-          <a:blip r:embed="rId4">
-            <a:extLst>
-              <a:ext uri="{28A0092B-C50C-407E-A947-70E740481C1C}">
-                <a14:useLocalDpi xmlns:a14="http://schemas.microsoft.com/office/drawing/2010/main" val="0"/>
-              </a:ext>
-            </a:extLst>
-          </a:blip>
-          <a:srcRect/>
-          <a:stretch>
-            <a:fillRect/>
-          </a:stretch>
-        </p:blipFill>
-        <p:spPr bwMode="auto">
-          <a:xfrm>
-            <a:off x="1111412" y="3129880"/>
-            <a:ext cx="3316574" cy="2315344"/>
-          </a:xfrm>
-          <a:prstGeom prst="rect">
-            <a:avLst/>
-          </a:prstGeom>
-          <a:noFill/>
-          <a:ln>
-            <a:noFill/>
-          </a:ln>
-          <a:extLst>
-            <a:ext uri="{909E8E84-426E-40DD-AFC4-6F175D3DCCD1}">
-              <a14:hiddenFill xmlns:a14="http://schemas.microsoft.com/office/drawing/2010/main">
-                <a:solidFill>
-                  <a:schemeClr val="accent1"/>
-                </a:solidFill>
-              </a14:hiddenFill>
-            </a:ext>
-            <a:ext uri="{91240B29-F687-4F45-9708-019B960494DF}">
-              <a14:hiddenLine xmlns:a14="http://schemas.microsoft.com/office/drawing/2010/main" w="9525">
-                <a:solidFill>
-                  <a:schemeClr val="tx1"/>
-                </a:solidFill>
-                <a:miter lim="800000"/>
-                <a:headEnd/>
-                <a:tailEnd/>
-              </a14:hiddenLine>
-            </a:ext>
-          </a:extLst>
-        </p:spPr>
-      </p:pic>
-      <p:pic>
-        <p:nvPicPr>
-          <p:cNvPr id="21" name="Picture 20"/>
-          <p:cNvPicPr>
-            <a:picLocks noChangeAspect="1" noChangeArrowheads="1"/>
-          </p:cNvPicPr>
-          <p:nvPr/>
-        </p:nvPicPr>
-        <p:blipFill>
-          <a:blip r:embed="rId5">
-            <a:extLst>
-              <a:ext uri="{28A0092B-C50C-407E-A947-70E740481C1C}">
-                <a14:useLocalDpi xmlns:a14="http://schemas.microsoft.com/office/drawing/2010/main" val="0"/>
-              </a:ext>
-            </a:extLst>
-          </a:blip>
-          <a:srcRect/>
-          <a:stretch>
-            <a:fillRect/>
-          </a:stretch>
-        </p:blipFill>
-        <p:spPr bwMode="auto">
-          <a:xfrm>
-            <a:off x="5143859" y="3129880"/>
-            <a:ext cx="3316574" cy="2315344"/>
-          </a:xfrm>
-          <a:prstGeom prst="rect">
-            <a:avLst/>
-          </a:prstGeom>
-          <a:noFill/>
-          <a:ln>
-            <a:noFill/>
-          </a:ln>
-          <a:extLst>
-            <a:ext uri="{909E8E84-426E-40DD-AFC4-6F175D3DCCD1}">
-              <a14:hiddenFill xmlns:a14="http://schemas.microsoft.com/office/drawing/2010/main">
-                <a:solidFill>
-                  <a:schemeClr val="accent1"/>
-                </a:solidFill>
-              </a14:hiddenFill>
-            </a:ext>
-            <a:ext uri="{91240B29-F687-4F45-9708-019B960494DF}">
-              <a14:hiddenLine xmlns:a14="http://schemas.microsoft.com/office/drawing/2010/main" w="9525">
-                <a:solidFill>
-                  <a:schemeClr val="tx1"/>
-                </a:solidFill>
-                <a:miter lim="800000"/>
-                <a:headEnd/>
-                <a:tailEnd/>
-              </a14:hiddenLine>
-            </a:ext>
-          </a:extLst>
-        </p:spPr>
-      </p:pic>
-      <p:sp>
-        <p:nvSpPr>
-          <p:cNvPr id="23" name="Textfeld 22"/>
-          <p:cNvSpPr txBox="1"/>
-          <p:nvPr/>
-        </p:nvSpPr>
-        <p:spPr>
-          <a:xfrm>
-            <a:off x="1229800" y="2840411"/>
-            <a:ext cx="3126177" cy="276999"/>
-          </a:xfrm>
-          <a:prstGeom prst="rect">
-            <a:avLst/>
-          </a:prstGeom>
-          <a:noFill/>
-        </p:spPr>
-        <p:txBody>
-          <a:bodyPr wrap="none" rtlCol="0">
-            <a:spAutoFit/>
-          </a:bodyPr>
-          <a:lstStyle/>
-          <a:p>
-            <a:r>
-              <a:rPr lang="en-GB" sz="1200" b="0" dirty="0" smtClean="0"/>
-              <a:t>Declaration Mode OFF (Engineering Mode)</a:t>
-            </a:r>
-            <a:endParaRPr lang="en-GB" sz="1200" b="0" dirty="0"/>
-          </a:p>
-        </p:txBody>
-      </p:sp>
-      <p:sp>
-        <p:nvSpPr>
-          <p:cNvPr id="45" name="Textfeld 44"/>
-          <p:cNvSpPr txBox="1"/>
-          <p:nvPr/>
-        </p:nvSpPr>
-        <p:spPr>
-          <a:xfrm>
-            <a:off x="5972432" y="2840412"/>
-            <a:ext cx="1659430" cy="276999"/>
-          </a:xfrm>
-          <a:prstGeom prst="rect">
-            <a:avLst/>
-          </a:prstGeom>
-          <a:noFill/>
-        </p:spPr>
-        <p:txBody>
-          <a:bodyPr wrap="none" rtlCol="0">
-            <a:spAutoFit/>
-          </a:bodyPr>
-          <a:lstStyle/>
-          <a:p>
-            <a:r>
-              <a:rPr lang="en-GB" sz="1200" b="0" dirty="0" smtClean="0"/>
-              <a:t>Declaration Mode ON</a:t>
-            </a:r>
-            <a:endParaRPr lang="en-GB" sz="1200" b="0" dirty="0"/>
-          </a:p>
-        </p:txBody>
-      </p:sp>
-      <p:sp>
-        <p:nvSpPr>
-          <p:cNvPr id="46" name="Textfeld 45"/>
-          <p:cNvSpPr txBox="1"/>
-          <p:nvPr/>
-        </p:nvSpPr>
-        <p:spPr>
-          <a:xfrm>
-            <a:off x="1111410" y="5482163"/>
-            <a:ext cx="3172558" cy="523220"/>
-          </a:xfrm>
-          <a:prstGeom prst="rect">
-            <a:avLst/>
-          </a:prstGeom>
-          <a:noFill/>
-        </p:spPr>
-        <p:txBody>
-          <a:bodyPr wrap="square" rtlCol="0">
-            <a:spAutoFit/>
-          </a:bodyPr>
-          <a:lstStyle/>
-          <a:p>
-            <a:pPr algn="l"/>
-            <a:r>
-              <a:rPr lang="en-GB" sz="1400" b="0" dirty="0" smtClean="0"/>
-              <a:t>Relative axle load and wheels inertia are user-defined</a:t>
-            </a:r>
-            <a:endParaRPr lang="en-GB" sz="1400" b="0" dirty="0"/>
-          </a:p>
-        </p:txBody>
-      </p:sp>
-      <p:sp>
-        <p:nvSpPr>
-          <p:cNvPr id="47" name="Textfeld 46"/>
-          <p:cNvSpPr txBox="1"/>
-          <p:nvPr/>
-        </p:nvSpPr>
-        <p:spPr>
-          <a:xfrm>
-            <a:off x="5215866" y="5478432"/>
-            <a:ext cx="3820630" cy="846386"/>
-          </a:xfrm>
-          <a:prstGeom prst="rect">
-            <a:avLst/>
-          </a:prstGeom>
-          <a:noFill/>
-        </p:spPr>
-        <p:txBody>
-          <a:bodyPr wrap="square" rtlCol="0">
-            <a:spAutoFit/>
-          </a:bodyPr>
-          <a:lstStyle/>
-          <a:p>
-            <a:pPr algn="l"/>
-            <a:r>
-              <a:rPr lang="en-GB" sz="1400" b="0" dirty="0" smtClean="0"/>
-              <a:t>Relative axle load is set according to HDV class and mission profile.</a:t>
-            </a:r>
-          </a:p>
-          <a:p>
-            <a:pPr algn="l"/>
-            <a:r>
-              <a:rPr lang="en-GB" sz="1400" b="0" dirty="0" smtClean="0"/>
-              <a:t>Wheels inertia depends on selected wheels</a:t>
-            </a:r>
-            <a:endParaRPr lang="en-GB" sz="1400" b="0" dirty="0"/>
-          </a:p>
-        </p:txBody>
-      </p:sp>
-      <p:sp>
-        <p:nvSpPr>
-          <p:cNvPr id="24" name="Rechteck 23"/>
-          <p:cNvSpPr/>
-          <p:nvPr/>
-        </p:nvSpPr>
-        <p:spPr bwMode="auto">
-          <a:xfrm>
-            <a:off x="1229803" y="3752850"/>
-            <a:ext cx="1496632" cy="252214"/>
-          </a:xfrm>
-          <a:prstGeom prst="rect">
-            <a:avLst/>
-          </a:prstGeom>
-          <a:noFill/>
-          <a:ln w="28575" cap="flat" cmpd="sng" algn="ctr">
-            <a:solidFill>
-              <a:srgbClr val="C00000"/>
-            </a:solidFill>
-            <a:prstDash val="solid"/>
-            <a:round/>
-            <a:headEnd type="none" w="med" len="med"/>
-            <a:tailEnd type="triangle" w="med" len="med"/>
-          </a:ln>
-          <a:effectLst/>
-          <a:extLst/>
-        </p:spPr>
-        <p:txBody>
-          <a:bodyPr vert="horz" wrap="square" lIns="91440" tIns="45720" rIns="91440" bIns="45720" numCol="1" rtlCol="0" anchor="ctr" anchorCtr="0" compatLnSpc="1">
-            <a:prstTxWarp prst="textNoShape">
-              <a:avLst/>
-            </a:prstTxWarp>
-            <a:noAutofit/>
-          </a:bodyPr>
-          <a:lstStyle/>
-          <a:p>
-            <a:pPr marL="0" marR="0" indent="0" algn="ctr" defTabSz="914400" rtl="0" eaLnBrk="1" fontAlgn="base" latinLnBrk="0" hangingPunct="1">
-              <a:lnSpc>
-                <a:spcPct val="100000"/>
-              </a:lnSpc>
-              <a:spcBef>
-                <a:spcPct val="30000"/>
-              </a:spcBef>
-              <a:spcAft>
-                <a:spcPct val="0"/>
-              </a:spcAft>
-              <a:buClrTx/>
-              <a:buSzTx/>
-              <a:buFontTx/>
-              <a:buNone/>
-              <a:tabLst/>
-            </a:pPr>
-            <a:endParaRPr kumimoji="0" lang="en-GB" sz="2000" b="1" i="0" u="none" strike="noStrike" cap="none" normalizeH="0" baseline="0" smtClean="0">
-              <a:ln>
-                <a:noFill/>
-              </a:ln>
-              <a:solidFill>
-                <a:schemeClr val="tx1"/>
-              </a:solidFill>
-              <a:effectLst/>
-              <a:latin typeface="Arial" pitchFamily="34" charset="0"/>
-            </a:endParaRPr>
-          </a:p>
-        </p:txBody>
-      </p:sp>
-      <p:sp>
-        <p:nvSpPr>
-          <p:cNvPr id="49" name="Rechteck 48"/>
-          <p:cNvSpPr/>
-          <p:nvPr/>
-        </p:nvSpPr>
-        <p:spPr bwMode="auto">
-          <a:xfrm>
-            <a:off x="2826447" y="3752850"/>
-            <a:ext cx="1457523" cy="252214"/>
-          </a:xfrm>
-          <a:prstGeom prst="rect">
-            <a:avLst/>
-          </a:prstGeom>
-          <a:noFill/>
-          <a:ln w="28575" cap="flat" cmpd="sng" algn="ctr">
-            <a:solidFill>
-              <a:srgbClr val="C00000"/>
-            </a:solidFill>
-            <a:prstDash val="solid"/>
-            <a:round/>
-            <a:headEnd type="none" w="med" len="med"/>
-            <a:tailEnd type="triangle" w="med" len="med"/>
-          </a:ln>
-          <a:effectLst/>
-          <a:extLst/>
-        </p:spPr>
-        <p:txBody>
-          <a:bodyPr vert="horz" wrap="square" lIns="91440" tIns="45720" rIns="91440" bIns="45720" numCol="1" rtlCol="0" anchor="ctr" anchorCtr="0" compatLnSpc="1">
-            <a:prstTxWarp prst="textNoShape">
-              <a:avLst/>
-            </a:prstTxWarp>
-            <a:noAutofit/>
-          </a:bodyPr>
-          <a:lstStyle/>
-          <a:p>
-            <a:pPr marL="0" marR="0" indent="0" algn="ctr" defTabSz="914400" rtl="0" eaLnBrk="1" fontAlgn="base" latinLnBrk="0" hangingPunct="1">
-              <a:lnSpc>
-                <a:spcPct val="100000"/>
-              </a:lnSpc>
-              <a:spcBef>
-                <a:spcPct val="30000"/>
-              </a:spcBef>
-              <a:spcAft>
-                <a:spcPct val="0"/>
-              </a:spcAft>
-              <a:buClrTx/>
-              <a:buSzTx/>
-              <a:buFontTx/>
-              <a:buNone/>
-              <a:tabLst/>
-            </a:pPr>
-            <a:endParaRPr kumimoji="0" lang="en-GB" sz="2000" b="1" i="0" u="none" strike="noStrike" cap="none" normalizeH="0" baseline="0" smtClean="0">
-              <a:ln>
-                <a:noFill/>
-              </a:ln>
-              <a:solidFill>
-                <a:schemeClr val="tx1"/>
-              </a:solidFill>
-              <a:effectLst/>
-              <a:latin typeface="Arial" pitchFamily="34" charset="0"/>
-            </a:endParaRPr>
-          </a:p>
-        </p:txBody>
-      </p:sp>
-      <p:cxnSp>
-        <p:nvCxnSpPr>
-          <p:cNvPr id="27" name="Gerade Verbindung mit Pfeil 26"/>
-          <p:cNvCxnSpPr/>
-          <p:nvPr/>
-        </p:nvCxnSpPr>
-        <p:spPr bwMode="auto">
-          <a:xfrm>
-            <a:off x="6457672" y="3614291"/>
-            <a:ext cx="945777" cy="204677"/>
-          </a:xfrm>
-          <a:prstGeom prst="straightConnector1">
-            <a:avLst/>
-          </a:prstGeom>
-          <a:solidFill>
-            <a:schemeClr val="accent1"/>
-          </a:solidFill>
-          <a:ln w="28575" cap="flat" cmpd="sng" algn="ctr">
-            <a:solidFill>
-              <a:srgbClr val="C00000"/>
-            </a:solidFill>
-            <a:prstDash val="solid"/>
-            <a:round/>
-            <a:headEnd type="none" w="med" len="med"/>
-            <a:tailEnd type="arrow"/>
-          </a:ln>
-          <a:effectLst/>
-          <a:extLst>
-            <a:ext uri="{AF507438-7753-43E0-B8FC-AC1667EBCBE1}">
-              <a14:hiddenEffects xmlns:a14="http://schemas.microsoft.com/office/drawing/2010/main">
-                <a:effectLst>
-                  <a:outerShdw dist="35921" dir="2700000" algn="ctr" rotWithShape="0">
-                    <a:schemeClr val="bg2"/>
-                  </a:outerShdw>
-                </a:effectLst>
-              </a14:hiddenEffects>
-            </a:ext>
-          </a:extLst>
-        </p:spPr>
-      </p:cxnSp>
     </p:spTree>
     <p:extLst>
       <p:ext uri="{BB962C8B-B14F-4D97-AF65-F5344CB8AC3E}">
-        <p14:creationId xmlns:p14="http://schemas.microsoft.com/office/powerpoint/2010/main" val="1419265606"/>
+        <p14:creationId xmlns:p14="http://schemas.microsoft.com/office/powerpoint/2010/main" val="3338804515"/>
       </p:ext>
     </p:extLst>
   </p:cSld>
@@ -34748,208 +34772,7 @@
       </p:grpSpPr>
       <p:sp>
         <p:nvSpPr>
-          <p:cNvPr id="25" name="Textfeld 24"/>
-          <p:cNvSpPr txBox="1"/>
-          <p:nvPr/>
-        </p:nvSpPr>
-        <p:spPr>
-          <a:xfrm>
-            <a:off x="251522" y="1196756"/>
-            <a:ext cx="8496944" cy="4739759"/>
-          </a:xfrm>
-          <a:prstGeom prst="rect">
-            <a:avLst/>
-          </a:prstGeom>
-          <a:noFill/>
-          <a:ln>
-            <a:noFill/>
-          </a:ln>
-        </p:spPr>
-        <p:txBody>
-          <a:bodyPr wrap="square" rtlCol="0">
-            <a:spAutoFit/>
-          </a:bodyPr>
-          <a:lstStyle/>
-          <a:p>
-            <a:pPr marL="342900" indent="-342900" algn="l">
-              <a:lnSpc>
-                <a:spcPct val="150000"/>
-              </a:lnSpc>
-              <a:spcBef>
-                <a:spcPts val="600"/>
-              </a:spcBef>
-              <a:buFont typeface="Arial" pitchFamily="34" charset="0"/>
-              <a:buChar char="•"/>
-            </a:pPr>
-            <a:r>
-              <a:rPr lang="en-GB" b="0" dirty="0" smtClean="0"/>
-              <a:t>Automatic assignment of generic values</a:t>
-            </a:r>
-          </a:p>
-          <a:p>
-            <a:pPr lvl="1" algn="l">
-              <a:lnSpc>
-                <a:spcPct val="150000"/>
-              </a:lnSpc>
-              <a:spcBef>
-                <a:spcPts val="600"/>
-              </a:spcBef>
-            </a:pPr>
-            <a:r>
-              <a:rPr lang="en-GB" dirty="0" smtClean="0"/>
-              <a:t>Examples:</a:t>
-            </a:r>
-          </a:p>
-          <a:p>
-            <a:pPr marL="800100" lvl="1" indent="-342900" algn="l">
-              <a:lnSpc>
-                <a:spcPct val="150000"/>
-              </a:lnSpc>
-              <a:spcBef>
-                <a:spcPts val="600"/>
-              </a:spcBef>
-              <a:buFont typeface="Arial" pitchFamily="34" charset="0"/>
-              <a:buChar char="•"/>
-            </a:pPr>
-            <a:r>
-              <a:rPr lang="en-GB" b="0" dirty="0" smtClean="0"/>
-              <a:t>Mission profiles 	...</a:t>
-            </a:r>
-            <a:r>
-              <a:rPr lang="en-GB" b="0" dirty="0"/>
-              <a:t>based on HDV class</a:t>
-            </a:r>
-            <a:endParaRPr lang="en-GB" b="0" dirty="0" smtClean="0"/>
-          </a:p>
-          <a:p>
-            <a:pPr marL="800100" lvl="1" indent="-342900" algn="l">
-              <a:lnSpc>
-                <a:spcPct val="150000"/>
-              </a:lnSpc>
-              <a:spcBef>
-                <a:spcPts val="600"/>
-              </a:spcBef>
-              <a:buFont typeface="Arial" pitchFamily="34" charset="0"/>
-              <a:buChar char="•"/>
-            </a:pPr>
-            <a:r>
-              <a:rPr lang="en-GB" b="0" dirty="0" smtClean="0"/>
-              <a:t>Loading		...based on HDV class and mission profile</a:t>
-            </a:r>
-          </a:p>
-          <a:p>
-            <a:pPr marL="800100" lvl="1" indent="-342900" algn="l">
-              <a:lnSpc>
-                <a:spcPct val="150000"/>
-              </a:lnSpc>
-              <a:spcBef>
-                <a:spcPts val="600"/>
-              </a:spcBef>
-              <a:buFont typeface="Arial" pitchFamily="34" charset="0"/>
-              <a:buChar char="•"/>
-            </a:pPr>
-            <a:r>
-              <a:rPr lang="en-GB" b="0" dirty="0" smtClean="0"/>
-              <a:t>Trailer RRC &amp; weight	...based </a:t>
-            </a:r>
-            <a:r>
-              <a:rPr lang="en-GB" b="0" dirty="0"/>
-              <a:t>on HDV class and mission </a:t>
-            </a:r>
-            <a:r>
-              <a:rPr lang="en-GB" b="0" dirty="0" smtClean="0"/>
-              <a:t>profile</a:t>
-            </a:r>
-          </a:p>
-          <a:p>
-            <a:pPr marL="800100" lvl="1" indent="-342900" algn="l">
-              <a:lnSpc>
-                <a:spcPct val="150000"/>
-              </a:lnSpc>
-              <a:spcBef>
-                <a:spcPts val="600"/>
-              </a:spcBef>
-              <a:buFont typeface="Arial" pitchFamily="34" charset="0"/>
-              <a:buChar char="•"/>
-            </a:pPr>
-            <a:r>
-              <a:rPr lang="en-GB" b="0" dirty="0" smtClean="0"/>
-              <a:t>Shift polygons	...based on full load curves</a:t>
-            </a:r>
-          </a:p>
-          <a:p>
-            <a:pPr marL="800100" lvl="1" indent="-342900" algn="l">
-              <a:lnSpc>
-                <a:spcPct val="150000"/>
-              </a:lnSpc>
-              <a:spcBef>
-                <a:spcPts val="600"/>
-              </a:spcBef>
-              <a:buFont typeface="Arial" pitchFamily="34" charset="0"/>
-              <a:buChar char="•"/>
-            </a:pPr>
-            <a:r>
-              <a:rPr lang="en-GB" b="0" dirty="0" smtClean="0"/>
-              <a:t>Engine inertia	...based on engine displacement</a:t>
-            </a:r>
-          </a:p>
-          <a:p>
-            <a:pPr marL="342900" indent="-342900" algn="l">
-              <a:lnSpc>
-                <a:spcPct val="150000"/>
-              </a:lnSpc>
-              <a:spcBef>
-                <a:spcPts val="600"/>
-              </a:spcBef>
-              <a:buFont typeface="Arial" pitchFamily="34" charset="0"/>
-              <a:buChar char="•"/>
-            </a:pPr>
-            <a:endParaRPr lang="en-GB" sz="1400" b="0" dirty="0"/>
-          </a:p>
-          <a:p>
-            <a:pPr marL="342900" indent="-342900" algn="l">
-              <a:lnSpc>
-                <a:spcPct val="150000"/>
-              </a:lnSpc>
-              <a:spcBef>
-                <a:spcPts val="600"/>
-              </a:spcBef>
-              <a:buFont typeface="Arial" pitchFamily="34" charset="0"/>
-              <a:buChar char="•"/>
-            </a:pPr>
-            <a:endParaRPr lang="en-GB" sz="1400" b="0" dirty="0" smtClean="0"/>
-          </a:p>
-          <a:p>
-            <a:pPr marL="342900" indent="-342900" algn="l">
-              <a:lnSpc>
-                <a:spcPct val="150000"/>
-              </a:lnSpc>
-              <a:spcBef>
-                <a:spcPts val="600"/>
-              </a:spcBef>
-              <a:buFont typeface="Arial" pitchFamily="34" charset="0"/>
-              <a:buChar char="•"/>
-            </a:pPr>
-            <a:endParaRPr lang="en-GB" sz="1400" b="0" dirty="0"/>
-          </a:p>
-          <a:p>
-            <a:pPr marL="342900" indent="-342900" algn="l">
-              <a:lnSpc>
-                <a:spcPct val="150000"/>
-              </a:lnSpc>
-              <a:spcBef>
-                <a:spcPts val="600"/>
-              </a:spcBef>
-              <a:buFont typeface="Arial" pitchFamily="34" charset="0"/>
-              <a:buChar char="•"/>
-            </a:pPr>
-            <a:endParaRPr lang="en-GB" sz="1400" b="0" dirty="0" smtClean="0"/>
-          </a:p>
-        </p:txBody>
-      </p:sp>
-      <p:sp>
-        <p:nvSpPr>
-          <p:cNvPr id="20" name="Rectangle 3"/>
+          <p:cNvPr id="17" name="Rectangle 3"/>
           <p:cNvSpPr txBox="1">
             <a:spLocks noChangeArrowheads="1"/>
           </p:cNvSpPr>
@@ -35136,17 +34959,412 @@
           <a:p>
             <a:pPr eaLnBrk="1" hangingPunct="1"/>
             <a:r>
-              <a:rPr lang="en-GB" sz="2800" kern="0" dirty="0" smtClean="0"/>
-              <a:t>Declaration Mode</a:t>
+              <a:rPr lang="en-GB" sz="2800" dirty="0" smtClean="0"/>
+              <a:t>WHTC Correction</a:t>
             </a:r>
             <a:endParaRPr lang="en-GB" sz="2800" kern="0" dirty="0"/>
+          </a:p>
+        </p:txBody>
+      </p:sp>
+      <p:sp>
+        <p:nvSpPr>
+          <p:cNvPr id="21" name="Textfeld 20"/>
+          <p:cNvSpPr txBox="1"/>
+          <p:nvPr/>
+        </p:nvSpPr>
+        <p:spPr>
+          <a:xfrm>
+            <a:off x="251522" y="1196756"/>
+            <a:ext cx="8496944" cy="4878771"/>
+          </a:xfrm>
+          <a:prstGeom prst="rect">
+            <a:avLst/>
+          </a:prstGeom>
+          <a:noFill/>
+          <a:ln>
+            <a:noFill/>
+          </a:ln>
+        </p:spPr>
+        <p:txBody>
+          <a:bodyPr wrap="square" rtlCol="0">
+            <a:spAutoFit/>
+          </a:bodyPr>
+          <a:lstStyle/>
+          <a:p>
+            <a:pPr marL="342900" indent="-342900" algn="l">
+              <a:lnSpc>
+                <a:spcPct val="150000"/>
+              </a:lnSpc>
+              <a:spcBef>
+                <a:spcPts val="600"/>
+              </a:spcBef>
+              <a:buFont typeface="+mj-lt"/>
+              <a:buAutoNum type="arabicPeriod"/>
+            </a:pPr>
+            <a:r>
+              <a:rPr lang="en-GB" b="0" dirty="0" smtClean="0"/>
+              <a:t>WHTC measurement results are defined in the Engine File</a:t>
+            </a:r>
+          </a:p>
+          <a:p>
+            <a:pPr marL="342900" indent="-342900" algn="l">
+              <a:lnSpc>
+                <a:spcPct val="150000"/>
+              </a:lnSpc>
+              <a:spcBef>
+                <a:spcPts val="600"/>
+              </a:spcBef>
+              <a:buFont typeface="+mj-lt"/>
+              <a:buAutoNum type="arabicPeriod"/>
+            </a:pPr>
+            <a:r>
+              <a:rPr lang="en-GB" b="0" dirty="0" smtClean="0"/>
+              <a:t>VECTO calculates WHTC with stationary FC map</a:t>
+            </a:r>
+          </a:p>
+          <a:p>
+            <a:pPr marL="342900" indent="-342900" algn="l">
+              <a:lnSpc>
+                <a:spcPct val="150000"/>
+              </a:lnSpc>
+              <a:spcBef>
+                <a:spcPts val="600"/>
+              </a:spcBef>
+              <a:buFont typeface="+mj-lt"/>
+              <a:buAutoNum type="arabicPeriod"/>
+            </a:pPr>
+            <a:r>
+              <a:rPr lang="en-GB" b="0" dirty="0" smtClean="0"/>
+              <a:t>Correction factor is calculated as measurement / calculation ratio </a:t>
+            </a:r>
+            <a:r>
+              <a:rPr lang="en-GB" b="0" dirty="0"/>
+              <a:t>using </a:t>
+            </a:r>
+            <a:r>
+              <a:rPr lang="en-GB" b="0" dirty="0" smtClean="0"/>
+              <a:t>weighting factors</a:t>
+            </a:r>
+          </a:p>
+          <a:p>
+            <a:pPr marL="342900" indent="-342900" algn="l">
+              <a:lnSpc>
+                <a:spcPct val="150000"/>
+              </a:lnSpc>
+              <a:spcBef>
+                <a:spcPts val="600"/>
+              </a:spcBef>
+              <a:buFont typeface="+mj-lt"/>
+              <a:buAutoNum type="arabicPeriod"/>
+            </a:pPr>
+            <a:endParaRPr lang="en-GB" b="0" dirty="0"/>
+          </a:p>
+          <a:p>
+            <a:pPr marL="342900" indent="-342900" algn="l">
+              <a:lnSpc>
+                <a:spcPct val="150000"/>
+              </a:lnSpc>
+              <a:spcBef>
+                <a:spcPts val="600"/>
+              </a:spcBef>
+              <a:buFont typeface="+mj-lt"/>
+              <a:buAutoNum type="arabicPeriod"/>
+            </a:pPr>
+            <a:endParaRPr lang="en-GB" b="0" dirty="0" smtClean="0"/>
+          </a:p>
+          <a:p>
+            <a:pPr marL="342900" indent="-342900" algn="l">
+              <a:lnSpc>
+                <a:spcPct val="150000"/>
+              </a:lnSpc>
+              <a:spcBef>
+                <a:spcPts val="600"/>
+              </a:spcBef>
+              <a:buFont typeface="+mj-lt"/>
+              <a:buAutoNum type="arabicPeriod"/>
+            </a:pPr>
+            <a:endParaRPr lang="en-GB" b="0" dirty="0" smtClean="0"/>
+          </a:p>
+          <a:p>
+            <a:pPr marL="342900" indent="-342900" algn="l">
+              <a:lnSpc>
+                <a:spcPct val="150000"/>
+              </a:lnSpc>
+              <a:spcBef>
+                <a:spcPts val="600"/>
+              </a:spcBef>
+              <a:buFont typeface="+mj-lt"/>
+              <a:buAutoNum type="arabicPeriod"/>
+            </a:pPr>
+            <a:endParaRPr lang="en-GB" b="0" dirty="0"/>
+          </a:p>
+          <a:p>
+            <a:pPr marL="342900" indent="-342900" algn="l">
+              <a:lnSpc>
+                <a:spcPct val="150000"/>
+              </a:lnSpc>
+              <a:spcBef>
+                <a:spcPts val="600"/>
+              </a:spcBef>
+              <a:buFont typeface="+mj-lt"/>
+              <a:buAutoNum type="arabicPeriod"/>
+            </a:pPr>
+            <a:endParaRPr lang="en-GB" b="0" dirty="0" smtClean="0"/>
+          </a:p>
+          <a:p>
+            <a:pPr marL="342900" indent="-342900" algn="l">
+              <a:lnSpc>
+                <a:spcPct val="150000"/>
+              </a:lnSpc>
+              <a:spcBef>
+                <a:spcPts val="600"/>
+              </a:spcBef>
+              <a:buFont typeface="+mj-lt"/>
+              <a:buAutoNum type="arabicPeriod"/>
+            </a:pPr>
+            <a:endParaRPr lang="en-GB" b="0" dirty="0"/>
+          </a:p>
+          <a:p>
+            <a:pPr marL="342900" indent="-342900" algn="l">
+              <a:lnSpc>
+                <a:spcPct val="150000"/>
+              </a:lnSpc>
+              <a:spcBef>
+                <a:spcPts val="600"/>
+              </a:spcBef>
+              <a:buFont typeface="+mj-lt"/>
+              <a:buAutoNum type="arabicPeriod"/>
+            </a:pPr>
+            <a:endParaRPr lang="en-GB" b="0" dirty="0" smtClean="0"/>
+          </a:p>
+          <a:p>
+            <a:pPr marL="342900" indent="-342900" algn="l">
+              <a:lnSpc>
+                <a:spcPct val="150000"/>
+              </a:lnSpc>
+              <a:spcBef>
+                <a:spcPts val="600"/>
+              </a:spcBef>
+              <a:buFont typeface="+mj-lt"/>
+              <a:buAutoNum type="arabicPeriod"/>
+            </a:pPr>
+            <a:r>
+              <a:rPr lang="en-GB" b="0" dirty="0" smtClean="0"/>
+              <a:t>The correction factor is multiplied to the VECTO FC results</a:t>
+            </a:r>
+          </a:p>
+        </p:txBody>
+      </p:sp>
+      <p:pic>
+        <p:nvPicPr>
+          <p:cNvPr id="1026" name="Picture 2"/>
+          <p:cNvPicPr>
+            <a:picLocks noChangeAspect="1" noChangeArrowheads="1"/>
+          </p:cNvPicPr>
+          <p:nvPr/>
+        </p:nvPicPr>
+        <p:blipFill rotWithShape="1">
+          <a:blip r:embed="rId2" cstate="print">
+            <a:extLst>
+              <a:ext uri="{28A0092B-C50C-407E-A947-70E740481C1C}">
+                <a14:useLocalDpi xmlns:a14="http://schemas.microsoft.com/office/drawing/2010/main" val="0"/>
+              </a:ext>
+            </a:extLst>
+          </a:blip>
+          <a:srcRect l="32813" r="32461"/>
+          <a:stretch/>
+        </p:blipFill>
+        <p:spPr bwMode="auto">
+          <a:xfrm>
+            <a:off x="899592" y="2492896"/>
+            <a:ext cx="2510278" cy="720080"/>
+          </a:xfrm>
+          <a:prstGeom prst="rect">
+            <a:avLst/>
+          </a:prstGeom>
+          <a:noFill/>
+          <a:ln>
+            <a:noFill/>
+          </a:ln>
+          <a:effectLst/>
+          <a:extLst>
+            <a:ext uri="{909E8E84-426E-40DD-AFC4-6F175D3DCCD1}">
+              <a14:hiddenFill xmlns:a14="http://schemas.microsoft.com/office/drawing/2010/main">
+                <a:solidFill>
+                  <a:schemeClr val="accent1"/>
+                </a:solidFill>
+              </a14:hiddenFill>
+            </a:ext>
+            <a:ext uri="{91240B29-F687-4F45-9708-019B960494DF}">
+              <a14:hiddenLine xmlns:a14="http://schemas.microsoft.com/office/drawing/2010/main" w="9525">
+                <a:solidFill>
+                  <a:schemeClr val="tx1"/>
+                </a:solidFill>
+                <a:miter lim="800000"/>
+                <a:headEnd/>
+                <a:tailEnd/>
+              </a14:hiddenLine>
+            </a:ext>
+            <a:ext uri="{AF507438-7753-43E0-B8FC-AC1667EBCBE1}">
+              <a14:hiddenEffects xmlns:a14="http://schemas.microsoft.com/office/drawing/2010/main">
+                <a:effectLst>
+                  <a:outerShdw dist="35921" dir="2700000" algn="ctr" rotWithShape="0">
+                    <a:schemeClr val="bg2"/>
+                  </a:outerShdw>
+                </a:effectLst>
+              </a14:hiddenEffects>
+            </a:ext>
+          </a:extLst>
+        </p:spPr>
+      </p:pic>
+      <p:sp>
+        <p:nvSpPr>
+          <p:cNvPr id="2" name="Rechteck 1"/>
+          <p:cNvSpPr/>
+          <p:nvPr/>
+        </p:nvSpPr>
+        <p:spPr>
+          <a:xfrm>
+            <a:off x="1187624" y="3356992"/>
+            <a:ext cx="7128792" cy="1708160"/>
+          </a:xfrm>
+          <a:prstGeom prst="rect">
+            <a:avLst/>
+          </a:prstGeom>
+        </p:spPr>
+        <p:txBody>
+          <a:bodyPr wrap="square">
+            <a:spAutoFit/>
+          </a:bodyPr>
+          <a:lstStyle/>
+          <a:p>
+            <a:pPr algn="l">
+              <a:lnSpc>
+                <a:spcPct val="150000"/>
+              </a:lnSpc>
+              <a:spcBef>
+                <a:spcPts val="0"/>
+              </a:spcBef>
+              <a:tabLst>
+                <a:tab pos="720000" algn="l"/>
+              </a:tabLst>
+            </a:pPr>
+            <a:r>
+              <a:rPr lang="en-GB" sz="1400" b="0" dirty="0" smtClean="0"/>
+              <a:t>CF</a:t>
+            </a:r>
+            <a:r>
+              <a:rPr lang="en-GB" sz="1400" b="0" baseline="-25000" dirty="0" smtClean="0"/>
+              <a:t>WHTC</a:t>
+            </a:r>
+            <a:r>
+              <a:rPr lang="en-GB" sz="1400" b="0" dirty="0" smtClean="0"/>
+              <a:t>	= WHTC Correction Factor [-]</a:t>
+            </a:r>
+          </a:p>
+          <a:p>
+            <a:pPr algn="l">
+              <a:lnSpc>
+                <a:spcPct val="150000"/>
+              </a:lnSpc>
+              <a:spcBef>
+                <a:spcPts val="0"/>
+              </a:spcBef>
+              <a:tabLst>
+                <a:tab pos="720000" algn="l"/>
+              </a:tabLst>
+            </a:pPr>
+            <a:r>
+              <a:rPr lang="en-GB" sz="1400" b="0" dirty="0" err="1" smtClean="0"/>
+              <a:t>i</a:t>
+            </a:r>
+            <a:r>
+              <a:rPr lang="en-GB" sz="1400" b="0" dirty="0" smtClean="0"/>
+              <a:t>	= index for each part (Urban, Rural, Motorway)</a:t>
+            </a:r>
+          </a:p>
+          <a:p>
+            <a:pPr algn="l">
+              <a:lnSpc>
+                <a:spcPct val="150000"/>
+              </a:lnSpc>
+              <a:spcBef>
+                <a:spcPts val="0"/>
+              </a:spcBef>
+              <a:tabLst>
+                <a:tab pos="720000" algn="l"/>
+              </a:tabLst>
+            </a:pPr>
+            <a:r>
+              <a:rPr lang="en-GB" sz="1400" b="0" dirty="0" smtClean="0"/>
+              <a:t>f</a:t>
+            </a:r>
+            <a:r>
+              <a:rPr lang="en-GB" sz="1400" b="0" baseline="-25000" dirty="0" smtClean="0"/>
+              <a:t>i</a:t>
+            </a:r>
+            <a:r>
+              <a:rPr lang="en-GB" sz="1400" b="0" dirty="0" smtClean="0"/>
+              <a:t>	= Weighting factor per part [-]</a:t>
+            </a:r>
+          </a:p>
+          <a:p>
+            <a:pPr algn="l">
+              <a:lnSpc>
+                <a:spcPct val="150000"/>
+              </a:lnSpc>
+              <a:spcBef>
+                <a:spcPts val="0"/>
+              </a:spcBef>
+              <a:tabLst>
+                <a:tab pos="720000" algn="l"/>
+              </a:tabLst>
+            </a:pPr>
+            <a:r>
+              <a:rPr lang="en-GB" sz="1400" b="0" dirty="0" err="1" smtClean="0"/>
+              <a:t>FC</a:t>
+            </a:r>
+            <a:r>
+              <a:rPr lang="en-GB" sz="1400" b="0" baseline="-25000" dirty="0" err="1" smtClean="0"/>
+              <a:t>meas_i</a:t>
+            </a:r>
+            <a:r>
+              <a:rPr lang="en-GB" sz="1400" b="0" dirty="0" smtClean="0"/>
+              <a:t>	= WHTC measurement result per part (input parameter) [g/kWh]</a:t>
+            </a:r>
+          </a:p>
+          <a:p>
+            <a:pPr algn="l">
+              <a:lnSpc>
+                <a:spcPct val="150000"/>
+              </a:lnSpc>
+              <a:spcBef>
+                <a:spcPts val="0"/>
+              </a:spcBef>
+              <a:tabLst>
+                <a:tab pos="720000" algn="l"/>
+              </a:tabLst>
+            </a:pPr>
+            <a:r>
+              <a:rPr lang="en-GB" sz="1400" b="0" dirty="0" err="1" smtClean="0"/>
+              <a:t>FC</a:t>
+            </a:r>
+            <a:r>
+              <a:rPr lang="en-GB" sz="1400" b="0" baseline="-25000" dirty="0" err="1" smtClean="0"/>
+              <a:t>calc_i</a:t>
+            </a:r>
+            <a:r>
+              <a:rPr lang="en-GB" sz="1400" b="0" dirty="0" smtClean="0"/>
+              <a:t>	= Calculated FC per part [g/kWh]</a:t>
+            </a:r>
+            <a:endParaRPr lang="en-GB" sz="1400" b="0" dirty="0"/>
           </a:p>
         </p:txBody>
       </p:sp>
     </p:spTree>
     <p:extLst>
       <p:ext uri="{BB962C8B-B14F-4D97-AF65-F5344CB8AC3E}">
-        <p14:creationId xmlns:p14="http://schemas.microsoft.com/office/powerpoint/2010/main" val="3338804515"/>
+        <p14:creationId xmlns:p14="http://schemas.microsoft.com/office/powerpoint/2010/main" val="711567437"/>
       </p:ext>
     </p:extLst>
   </p:cSld>
@@ -43937,7 +44155,147 @@
       </p:grpSpPr>
       <p:sp>
         <p:nvSpPr>
-          <p:cNvPr id="17" name="Rectangle 3"/>
+          <p:cNvPr id="25" name="Textfeld 24"/>
+          <p:cNvSpPr txBox="1"/>
+          <p:nvPr/>
+        </p:nvSpPr>
+        <p:spPr>
+          <a:xfrm>
+            <a:off x="251522" y="1196752"/>
+            <a:ext cx="8496944" cy="3231654"/>
+          </a:xfrm>
+          <a:prstGeom prst="rect">
+            <a:avLst/>
+          </a:prstGeom>
+          <a:noFill/>
+          <a:ln>
+            <a:noFill/>
+          </a:ln>
+        </p:spPr>
+        <p:txBody>
+          <a:bodyPr wrap="square" rtlCol="0">
+            <a:spAutoFit/>
+          </a:bodyPr>
+          <a:lstStyle/>
+          <a:p>
+            <a:pPr marL="342900" indent="-342900" algn="l">
+              <a:lnSpc>
+                <a:spcPct val="150000"/>
+              </a:lnSpc>
+              <a:spcBef>
+                <a:spcPts val="600"/>
+              </a:spcBef>
+              <a:buFont typeface="Arial" pitchFamily="34" charset="0"/>
+              <a:buChar char="•"/>
+            </a:pPr>
+            <a:r>
+              <a:rPr lang="en-IE" sz="1800" dirty="0"/>
+              <a:t>Old format </a:t>
+            </a:r>
+            <a:r>
+              <a:rPr lang="en-IE" sz="1800" dirty="0" smtClean="0"/>
+              <a:t>scrapped; </a:t>
+            </a:r>
+            <a:r>
+              <a:rPr lang="en-IE" sz="1800" dirty="0"/>
+              <a:t>only JSON and CSV is </a:t>
+            </a:r>
+            <a:r>
+              <a:rPr lang="en-IE" sz="1800" dirty="0" smtClean="0"/>
+              <a:t>supported</a:t>
+            </a:r>
+            <a:endParaRPr lang="en-IE" sz="1800" dirty="0"/>
+          </a:p>
+          <a:p>
+            <a:pPr marL="342900" indent="-342900" algn="l">
+              <a:lnSpc>
+                <a:spcPct val="150000"/>
+              </a:lnSpc>
+              <a:spcBef>
+                <a:spcPts val="600"/>
+              </a:spcBef>
+              <a:buFont typeface="Arial" pitchFamily="34" charset="0"/>
+              <a:buChar char="•"/>
+            </a:pPr>
+            <a:r>
+              <a:rPr lang="en-IE" sz="1800" dirty="0" smtClean="0"/>
+              <a:t>CSVs: New </a:t>
+            </a:r>
+            <a:r>
+              <a:rPr lang="en-IE" sz="1800" dirty="0"/>
+              <a:t>comment symbol </a:t>
+            </a:r>
+            <a:r>
+              <a:rPr lang="en-IE" sz="1800" dirty="0" smtClean="0"/>
+              <a:t>is "#" (instead </a:t>
+            </a:r>
+            <a:r>
+              <a:rPr lang="en-IE" sz="1800" dirty="0"/>
+              <a:t>of "</a:t>
+            </a:r>
+            <a:r>
+              <a:rPr lang="en-IE" sz="1800" dirty="0" smtClean="0"/>
+              <a:t>c“)</a:t>
+            </a:r>
+          </a:p>
+          <a:p>
+            <a:pPr marL="342900" indent="-342900" algn="l">
+              <a:lnSpc>
+                <a:spcPct val="150000"/>
+              </a:lnSpc>
+              <a:spcBef>
+                <a:spcPts val="600"/>
+              </a:spcBef>
+              <a:buFont typeface="Arial" pitchFamily="34" charset="0"/>
+              <a:buChar char="•"/>
+            </a:pPr>
+            <a:r>
+              <a:rPr lang="en-IE" sz="1800" dirty="0" smtClean="0"/>
+              <a:t>CSVs: One and only one header-line is required (which must not be a comment line)</a:t>
+            </a:r>
+          </a:p>
+          <a:p>
+            <a:pPr marL="342900" indent="-342900" algn="l">
+              <a:lnSpc>
+                <a:spcPct val="150000"/>
+              </a:lnSpc>
+              <a:spcBef>
+                <a:spcPts val="600"/>
+              </a:spcBef>
+              <a:buFont typeface="Arial" pitchFamily="34" charset="0"/>
+              <a:buChar char="•"/>
+            </a:pPr>
+            <a:r>
+              <a:rPr lang="en-IE" sz="1800" dirty="0" smtClean="0"/>
+              <a:t>The formats are described in </a:t>
+            </a:r>
+            <a:r>
+              <a:rPr lang="en-IE" sz="1800" dirty="0"/>
+              <a:t>the HTML User Manual under </a:t>
+            </a:r>
+            <a:r>
+              <a:rPr lang="en-IE" sz="1800" dirty="0" smtClean="0"/>
+              <a:t>“Input </a:t>
+            </a:r>
+            <a:r>
+              <a:rPr lang="en-IE" sz="1800" dirty="0"/>
+              <a:t>and Output </a:t>
+            </a:r>
+            <a:r>
+              <a:rPr lang="en-IE" sz="1800" dirty="0" smtClean="0"/>
+              <a:t>Files” &gt; “CSV Format” </a:t>
+            </a:r>
+            <a:r>
+              <a:rPr lang="en-IE" sz="1800" dirty="0"/>
+              <a:t>and in each input file page of the user manual.</a:t>
+            </a:r>
+            <a:endParaRPr lang="en-GB" sz="1800" b="0" dirty="0" smtClean="0"/>
+          </a:p>
+        </p:txBody>
+      </p:sp>
+      <p:sp>
+        <p:nvSpPr>
+          <p:cNvPr id="20" name="Rectangle 3"/>
           <p:cNvSpPr txBox="1">
             <a:spLocks noChangeArrowheads="1"/>
           </p:cNvSpPr>
@@ -44124,412 +44482,17 @@
           <a:p>
             <a:pPr eaLnBrk="1" hangingPunct="1"/>
             <a:r>
-              <a:rPr lang="en-GB" sz="2800" dirty="0" smtClean="0"/>
-              <a:t>WHTC Correction</a:t>
+              <a:rPr lang="en-GB" sz="2800" kern="0" dirty="0" smtClean="0"/>
+              <a:t>File-format changes</a:t>
             </a:r>
             <a:endParaRPr lang="en-GB" sz="2800" kern="0" dirty="0"/>
-          </a:p>
-        </p:txBody>
-      </p:sp>
-      <p:sp>
-        <p:nvSpPr>
-          <p:cNvPr id="21" name="Textfeld 20"/>
-          <p:cNvSpPr txBox="1"/>
-          <p:nvPr/>
-        </p:nvSpPr>
-        <p:spPr>
-          <a:xfrm>
-            <a:off x="251522" y="1196756"/>
-            <a:ext cx="8496944" cy="4878771"/>
-          </a:xfrm>
-          <a:prstGeom prst="rect">
-            <a:avLst/>
-          </a:prstGeom>
-          <a:noFill/>
-          <a:ln>
-            <a:noFill/>
-          </a:ln>
-        </p:spPr>
-        <p:txBody>
-          <a:bodyPr wrap="square" rtlCol="0">
-            <a:spAutoFit/>
-          </a:bodyPr>
-          <a:lstStyle/>
-          <a:p>
-            <a:pPr marL="342900" indent="-342900" algn="l">
-              <a:lnSpc>
-                <a:spcPct val="150000"/>
-              </a:lnSpc>
-              <a:spcBef>
-                <a:spcPts val="600"/>
-              </a:spcBef>
-              <a:buFont typeface="+mj-lt"/>
-              <a:buAutoNum type="arabicPeriod"/>
-            </a:pPr>
-            <a:r>
-              <a:rPr lang="en-GB" b="0" dirty="0" smtClean="0"/>
-              <a:t>WHTC measurement results are defined in the Engine File</a:t>
-            </a:r>
-          </a:p>
-          <a:p>
-            <a:pPr marL="342900" indent="-342900" algn="l">
-              <a:lnSpc>
-                <a:spcPct val="150000"/>
-              </a:lnSpc>
-              <a:spcBef>
-                <a:spcPts val="600"/>
-              </a:spcBef>
-              <a:buFont typeface="+mj-lt"/>
-              <a:buAutoNum type="arabicPeriod"/>
-            </a:pPr>
-            <a:r>
-              <a:rPr lang="en-GB" b="0" dirty="0" smtClean="0"/>
-              <a:t>VECTO calculates WHTC with stationary FC map</a:t>
-            </a:r>
-          </a:p>
-          <a:p>
-            <a:pPr marL="342900" indent="-342900" algn="l">
-              <a:lnSpc>
-                <a:spcPct val="150000"/>
-              </a:lnSpc>
-              <a:spcBef>
-                <a:spcPts val="600"/>
-              </a:spcBef>
-              <a:buFont typeface="+mj-lt"/>
-              <a:buAutoNum type="arabicPeriod"/>
-            </a:pPr>
-            <a:r>
-              <a:rPr lang="en-GB" b="0" dirty="0" smtClean="0"/>
-              <a:t>Correction factor is calculated as measurement / calculation ratio </a:t>
-            </a:r>
-            <a:r>
-              <a:rPr lang="en-GB" b="0" dirty="0"/>
-              <a:t>using </a:t>
-            </a:r>
-            <a:r>
-              <a:rPr lang="en-GB" b="0" dirty="0" smtClean="0"/>
-              <a:t>weighting factors</a:t>
-            </a:r>
-          </a:p>
-          <a:p>
-            <a:pPr marL="342900" indent="-342900" algn="l">
-              <a:lnSpc>
-                <a:spcPct val="150000"/>
-              </a:lnSpc>
-              <a:spcBef>
-                <a:spcPts val="600"/>
-              </a:spcBef>
-              <a:buFont typeface="+mj-lt"/>
-              <a:buAutoNum type="arabicPeriod"/>
-            </a:pPr>
-            <a:endParaRPr lang="en-GB" b="0" dirty="0"/>
-          </a:p>
-          <a:p>
-            <a:pPr marL="342900" indent="-342900" algn="l">
-              <a:lnSpc>
-                <a:spcPct val="150000"/>
-              </a:lnSpc>
-              <a:spcBef>
-                <a:spcPts val="600"/>
-              </a:spcBef>
-              <a:buFont typeface="+mj-lt"/>
-              <a:buAutoNum type="arabicPeriod"/>
-            </a:pPr>
-            <a:endParaRPr lang="en-GB" b="0" dirty="0" smtClean="0"/>
-          </a:p>
-          <a:p>
-            <a:pPr marL="342900" indent="-342900" algn="l">
-              <a:lnSpc>
-                <a:spcPct val="150000"/>
-              </a:lnSpc>
-              <a:spcBef>
-                <a:spcPts val="600"/>
-              </a:spcBef>
-              <a:buFont typeface="+mj-lt"/>
-              <a:buAutoNum type="arabicPeriod"/>
-            </a:pPr>
-            <a:endParaRPr lang="en-GB" b="0" dirty="0" smtClean="0"/>
-          </a:p>
-          <a:p>
-            <a:pPr marL="342900" indent="-342900" algn="l">
-              <a:lnSpc>
-                <a:spcPct val="150000"/>
-              </a:lnSpc>
-              <a:spcBef>
-                <a:spcPts val="600"/>
-              </a:spcBef>
-              <a:buFont typeface="+mj-lt"/>
-              <a:buAutoNum type="arabicPeriod"/>
-            </a:pPr>
-            <a:endParaRPr lang="en-GB" b="0" dirty="0"/>
-          </a:p>
-          <a:p>
-            <a:pPr marL="342900" indent="-342900" algn="l">
-              <a:lnSpc>
-                <a:spcPct val="150000"/>
-              </a:lnSpc>
-              <a:spcBef>
-                <a:spcPts val="600"/>
-              </a:spcBef>
-              <a:buFont typeface="+mj-lt"/>
-              <a:buAutoNum type="arabicPeriod"/>
-            </a:pPr>
-            <a:endParaRPr lang="en-GB" b="0" dirty="0" smtClean="0"/>
-          </a:p>
-          <a:p>
-            <a:pPr marL="342900" indent="-342900" algn="l">
-              <a:lnSpc>
-                <a:spcPct val="150000"/>
-              </a:lnSpc>
-              <a:spcBef>
-                <a:spcPts val="600"/>
-              </a:spcBef>
-              <a:buFont typeface="+mj-lt"/>
-              <a:buAutoNum type="arabicPeriod"/>
-            </a:pPr>
-            <a:endParaRPr lang="en-GB" b="0" dirty="0"/>
-          </a:p>
-          <a:p>
-            <a:pPr marL="342900" indent="-342900" algn="l">
-              <a:lnSpc>
-                <a:spcPct val="150000"/>
-              </a:lnSpc>
-              <a:spcBef>
-                <a:spcPts val="600"/>
-              </a:spcBef>
-              <a:buFont typeface="+mj-lt"/>
-              <a:buAutoNum type="arabicPeriod"/>
-            </a:pPr>
-            <a:endParaRPr lang="en-GB" b="0" dirty="0" smtClean="0"/>
-          </a:p>
-          <a:p>
-            <a:pPr marL="342900" indent="-342900" algn="l">
-              <a:lnSpc>
-                <a:spcPct val="150000"/>
-              </a:lnSpc>
-              <a:spcBef>
-                <a:spcPts val="600"/>
-              </a:spcBef>
-              <a:buFont typeface="+mj-lt"/>
-              <a:buAutoNum type="arabicPeriod"/>
-            </a:pPr>
-            <a:r>
-              <a:rPr lang="en-GB" b="0" dirty="0" smtClean="0"/>
-              <a:t>The correction factor is multiplied to the VECTO FC results</a:t>
-            </a:r>
-          </a:p>
-        </p:txBody>
-      </p:sp>
-      <p:pic>
-        <p:nvPicPr>
-          <p:cNvPr id="1026" name="Picture 2"/>
-          <p:cNvPicPr>
-            <a:picLocks noChangeAspect="1" noChangeArrowheads="1"/>
-          </p:cNvPicPr>
-          <p:nvPr/>
-        </p:nvPicPr>
-        <p:blipFill rotWithShape="1">
-          <a:blip r:embed="rId2" cstate="print">
-            <a:extLst>
-              <a:ext uri="{28A0092B-C50C-407E-A947-70E740481C1C}">
-                <a14:useLocalDpi xmlns:a14="http://schemas.microsoft.com/office/drawing/2010/main" val="0"/>
-              </a:ext>
-            </a:extLst>
-          </a:blip>
-          <a:srcRect l="32813" r="32461"/>
-          <a:stretch/>
-        </p:blipFill>
-        <p:spPr bwMode="auto">
-          <a:xfrm>
-            <a:off x="899592" y="2492896"/>
-            <a:ext cx="2510278" cy="720080"/>
-          </a:xfrm>
-          <a:prstGeom prst="rect">
-            <a:avLst/>
-          </a:prstGeom>
-          <a:noFill/>
-          <a:ln>
-            <a:noFill/>
-          </a:ln>
-          <a:effectLst/>
-          <a:extLst>
-            <a:ext uri="{909E8E84-426E-40DD-AFC4-6F175D3DCCD1}">
-              <a14:hiddenFill xmlns:a14="http://schemas.microsoft.com/office/drawing/2010/main">
-                <a:solidFill>
-                  <a:schemeClr val="accent1"/>
-                </a:solidFill>
-              </a14:hiddenFill>
-            </a:ext>
-            <a:ext uri="{91240B29-F687-4F45-9708-019B960494DF}">
-              <a14:hiddenLine xmlns:a14="http://schemas.microsoft.com/office/drawing/2010/main" w="9525">
-                <a:solidFill>
-                  <a:schemeClr val="tx1"/>
-                </a:solidFill>
-                <a:miter lim="800000"/>
-                <a:headEnd/>
-                <a:tailEnd/>
-              </a14:hiddenLine>
-            </a:ext>
-            <a:ext uri="{AF507438-7753-43E0-B8FC-AC1667EBCBE1}">
-              <a14:hiddenEffects xmlns:a14="http://schemas.microsoft.com/office/drawing/2010/main">
-                <a:effectLst>
-                  <a:outerShdw dist="35921" dir="2700000" algn="ctr" rotWithShape="0">
-                    <a:schemeClr val="bg2"/>
-                  </a:outerShdw>
-                </a:effectLst>
-              </a14:hiddenEffects>
-            </a:ext>
-          </a:extLst>
-        </p:spPr>
-      </p:pic>
-      <p:sp>
-        <p:nvSpPr>
-          <p:cNvPr id="2" name="Rechteck 1"/>
-          <p:cNvSpPr/>
-          <p:nvPr/>
-        </p:nvSpPr>
-        <p:spPr>
-          <a:xfrm>
-            <a:off x="1187624" y="3356992"/>
-            <a:ext cx="7128792" cy="1708160"/>
-          </a:xfrm>
-          <a:prstGeom prst="rect">
-            <a:avLst/>
-          </a:prstGeom>
-        </p:spPr>
-        <p:txBody>
-          <a:bodyPr wrap="square">
-            <a:spAutoFit/>
-          </a:bodyPr>
-          <a:lstStyle/>
-          <a:p>
-            <a:pPr algn="l">
-              <a:lnSpc>
-                <a:spcPct val="150000"/>
-              </a:lnSpc>
-              <a:spcBef>
-                <a:spcPts val="0"/>
-              </a:spcBef>
-              <a:tabLst>
-                <a:tab pos="720000" algn="l"/>
-              </a:tabLst>
-            </a:pPr>
-            <a:r>
-              <a:rPr lang="en-GB" sz="1400" b="0" dirty="0" smtClean="0"/>
-              <a:t>CF</a:t>
-            </a:r>
-            <a:r>
-              <a:rPr lang="en-GB" sz="1400" b="0" baseline="-25000" dirty="0" smtClean="0"/>
-              <a:t>WHTC</a:t>
-            </a:r>
-            <a:r>
-              <a:rPr lang="en-GB" sz="1400" b="0" dirty="0" smtClean="0"/>
-              <a:t>	= WHTC Correction Factor [-]</a:t>
-            </a:r>
-          </a:p>
-          <a:p>
-            <a:pPr algn="l">
-              <a:lnSpc>
-                <a:spcPct val="150000"/>
-              </a:lnSpc>
-              <a:spcBef>
-                <a:spcPts val="0"/>
-              </a:spcBef>
-              <a:tabLst>
-                <a:tab pos="720000" algn="l"/>
-              </a:tabLst>
-            </a:pPr>
-            <a:r>
-              <a:rPr lang="en-GB" sz="1400" b="0" dirty="0" err="1" smtClean="0"/>
-              <a:t>i</a:t>
-            </a:r>
-            <a:r>
-              <a:rPr lang="en-GB" sz="1400" b="0" dirty="0" smtClean="0"/>
-              <a:t>	= index for each part (Urban, Rural, Motorway)</a:t>
-            </a:r>
-          </a:p>
-          <a:p>
-            <a:pPr algn="l">
-              <a:lnSpc>
-                <a:spcPct val="150000"/>
-              </a:lnSpc>
-              <a:spcBef>
-                <a:spcPts val="0"/>
-              </a:spcBef>
-              <a:tabLst>
-                <a:tab pos="720000" algn="l"/>
-              </a:tabLst>
-            </a:pPr>
-            <a:r>
-              <a:rPr lang="en-GB" sz="1400" b="0" dirty="0" smtClean="0"/>
-              <a:t>f</a:t>
-            </a:r>
-            <a:r>
-              <a:rPr lang="en-GB" sz="1400" b="0" baseline="-25000" dirty="0" smtClean="0"/>
-              <a:t>i</a:t>
-            </a:r>
-            <a:r>
-              <a:rPr lang="en-GB" sz="1400" b="0" dirty="0" smtClean="0"/>
-              <a:t>	= Weighting factor per part [-]</a:t>
-            </a:r>
-          </a:p>
-          <a:p>
-            <a:pPr algn="l">
-              <a:lnSpc>
-                <a:spcPct val="150000"/>
-              </a:lnSpc>
-              <a:spcBef>
-                <a:spcPts val="0"/>
-              </a:spcBef>
-              <a:tabLst>
-                <a:tab pos="720000" algn="l"/>
-              </a:tabLst>
-            </a:pPr>
-            <a:r>
-              <a:rPr lang="en-GB" sz="1400" b="0" dirty="0" err="1" smtClean="0"/>
-              <a:t>FC</a:t>
-            </a:r>
-            <a:r>
-              <a:rPr lang="en-GB" sz="1400" b="0" baseline="-25000" dirty="0" err="1" smtClean="0"/>
-              <a:t>meas_i</a:t>
-            </a:r>
-            <a:r>
-              <a:rPr lang="en-GB" sz="1400" b="0" dirty="0" smtClean="0"/>
-              <a:t>	= WHTC measurement result per part (input parameter) [g/kWh]</a:t>
-            </a:r>
-          </a:p>
-          <a:p>
-            <a:pPr algn="l">
-              <a:lnSpc>
-                <a:spcPct val="150000"/>
-              </a:lnSpc>
-              <a:spcBef>
-                <a:spcPts val="0"/>
-              </a:spcBef>
-              <a:tabLst>
-                <a:tab pos="720000" algn="l"/>
-              </a:tabLst>
-            </a:pPr>
-            <a:r>
-              <a:rPr lang="en-GB" sz="1400" b="0" dirty="0" err="1" smtClean="0"/>
-              <a:t>FC</a:t>
-            </a:r>
-            <a:r>
-              <a:rPr lang="en-GB" sz="1400" b="0" baseline="-25000" dirty="0" err="1" smtClean="0"/>
-              <a:t>calc_i</a:t>
-            </a:r>
-            <a:r>
-              <a:rPr lang="en-GB" sz="1400" b="0" dirty="0" smtClean="0"/>
-              <a:t>	= Calculated FC per part [g/kWh]</a:t>
-            </a:r>
-            <a:endParaRPr lang="en-GB" sz="1400" b="0" dirty="0"/>
           </a:p>
         </p:txBody>
       </p:sp>
     </p:spTree>
     <p:extLst>
       <p:ext uri="{BB962C8B-B14F-4D97-AF65-F5344CB8AC3E}">
-        <p14:creationId xmlns:p14="http://schemas.microsoft.com/office/powerpoint/2010/main" val="711567437"/>
+        <p14:creationId xmlns:p14="http://schemas.microsoft.com/office/powerpoint/2010/main" val="1434757261"/>
       </p:ext>
     </p:extLst>
   </p:cSld>

</xml_diff>